<commit_message>
Update the JHH analysis figure
</commit_message>
<xml_diff>
--- a/utils/JHHAnalysis.pptx
+++ b/utils/JHHAnalysis.pptx
@@ -3357,77 +3357,12 @@
           <a:chExt cx="0" cy="0"/>
         </a:xfrm>
       </p:grpSpPr>
-      <p:pic>
-        <p:nvPicPr>
-          <p:cNvPr id="5" name="Picture 4">
-            <a:extLst>
-              <a:ext uri="{FF2B5EF4-FFF2-40B4-BE49-F238E27FC236}">
-                <a16:creationId xmlns:a16="http://schemas.microsoft.com/office/drawing/2014/main" id="{34B7F4B9-8780-5AD0-E505-2E842520CD54}"/>
-              </a:ext>
-            </a:extLst>
-          </p:cNvPr>
-          <p:cNvPicPr>
-            <a:picLocks noChangeAspect="1"/>
-          </p:cNvPicPr>
-          <p:nvPr/>
-        </p:nvPicPr>
-        <p:blipFill>
-          <a:blip r:embed="rId2"/>
-          <a:stretch>
-            <a:fillRect/>
-          </a:stretch>
-        </p:blipFill>
-        <p:spPr>
-          <a:xfrm>
-            <a:off x="5247713" y="410208"/>
-            <a:ext cx="4718812" cy="4798793"/>
-          </a:xfrm>
-          <a:prstGeom prst="rect">
-            <a:avLst/>
-          </a:prstGeom>
-        </p:spPr>
-      </p:pic>
-      <p:sp>
-        <p:nvSpPr>
-          <p:cNvPr id="12" name="TextBox 11">
-            <a:extLst>
-              <a:ext uri="{FF2B5EF4-FFF2-40B4-BE49-F238E27FC236}">
-                <a16:creationId xmlns:a16="http://schemas.microsoft.com/office/drawing/2014/main" id="{9E30DB82-7CC0-9574-6B21-C40831B9CA54}"/>
-              </a:ext>
-            </a:extLst>
-          </p:cNvPr>
-          <p:cNvSpPr txBox="1"/>
-          <p:nvPr/>
-        </p:nvSpPr>
-        <p:spPr>
-          <a:xfrm>
-            <a:off x="1023687" y="2898096"/>
-            <a:ext cx="3904945" cy="307777"/>
-          </a:xfrm>
-          <a:prstGeom prst="rect">
-            <a:avLst/>
-          </a:prstGeom>
-          <a:noFill/>
-        </p:spPr>
-        <p:txBody>
-          <a:bodyPr wrap="square" rtlCol="0">
-            <a:spAutoFit/>
-          </a:bodyPr>
-          <a:lstStyle/>
-          <a:p>
-            <a:r>
-              <a:rPr lang="en-US" sz="1400" dirty="0"/>
-              <a:t>(a) overall analysis of per-algorithm average DSC</a:t>
-            </a:r>
-          </a:p>
-        </p:txBody>
-      </p:sp>
       <p:grpSp>
         <p:nvGrpSpPr>
-          <p:cNvPr id="24" name="Group 23">
-            <a:extLst>
-              <a:ext uri="{FF2B5EF4-FFF2-40B4-BE49-F238E27FC236}">
-                <a16:creationId xmlns:a16="http://schemas.microsoft.com/office/drawing/2014/main" id="{40C0D058-B642-A8FC-B582-0DCEE45D9106}"/>
+          <p:cNvPr id="25" name="Group 24">
+            <a:extLst>
+              <a:ext uri="{FF2B5EF4-FFF2-40B4-BE49-F238E27FC236}">
+                <a16:creationId xmlns:a16="http://schemas.microsoft.com/office/drawing/2014/main" id="{7D07043D-DFE7-1EC9-BE23-414D3BE02E4A}"/>
               </a:ext>
             </a:extLst>
           </p:cNvPr>
@@ -3436,359 +3371,430 @@
         </p:nvGrpSpPr>
         <p:grpSpPr>
           <a:xfrm>
-            <a:off x="870154" y="3197251"/>
-            <a:ext cx="4392794" cy="2042211"/>
-            <a:chOff x="870154" y="3197251"/>
-            <a:chExt cx="4392794" cy="2042211"/>
+            <a:off x="5247713" y="410209"/>
+            <a:ext cx="4974970" cy="5116416"/>
+            <a:chOff x="5247713" y="410209"/>
+            <a:chExt cx="4974970" cy="5116416"/>
           </a:xfrm>
         </p:grpSpPr>
-        <p:grpSp>
-          <p:nvGrpSpPr>
-            <p:cNvPr id="17" name="Group 16">
+        <p:pic>
+          <p:nvPicPr>
+            <p:cNvPr id="5" name="Picture 4">
               <a:extLst>
                 <a:ext uri="{FF2B5EF4-FFF2-40B4-BE49-F238E27FC236}">
-                  <a16:creationId xmlns:a16="http://schemas.microsoft.com/office/drawing/2014/main" id="{7FA07373-DCD9-9CEF-6343-D64CCEF3476C}"/>
+                  <a16:creationId xmlns:a16="http://schemas.microsoft.com/office/drawing/2014/main" id="{34B7F4B9-8780-5AD0-E505-2E842520CD54}"/>
                 </a:ext>
               </a:extLst>
             </p:cNvPr>
-            <p:cNvGrpSpPr/>
+            <p:cNvPicPr>
+              <a:picLocks noChangeAspect="1"/>
+            </p:cNvPicPr>
             <p:nvPr/>
-          </p:nvGrpSpPr>
-          <p:grpSpPr>
+          </p:nvPicPr>
+          <p:blipFill>
+            <a:blip r:embed="rId2"/>
+            <a:srcRect/>
+            <a:stretch/>
+          </p:blipFill>
+          <p:spPr>
             <a:xfrm>
-              <a:off x="870154" y="3197251"/>
-              <a:ext cx="1883625" cy="1942758"/>
-              <a:chOff x="870154" y="3197251"/>
-              <a:chExt cx="1883625" cy="1942758"/>
+              <a:off x="5247713" y="410209"/>
+              <a:ext cx="4718812" cy="4798791"/>
             </a:xfrm>
-          </p:grpSpPr>
-          <p:pic>
-            <p:nvPicPr>
-              <p:cNvPr id="7" name="Picture 6">
-                <a:extLst>
-                  <a:ext uri="{FF2B5EF4-FFF2-40B4-BE49-F238E27FC236}">
-                    <a16:creationId xmlns:a16="http://schemas.microsoft.com/office/drawing/2014/main" id="{E8BEE714-789E-FE90-A1C7-AC260419A9ED}"/>
-                  </a:ext>
-                </a:extLst>
-              </p:cNvPr>
-              <p:cNvPicPr>
-                <a:picLocks noChangeAspect="1"/>
-              </p:cNvPicPr>
-              <p:nvPr/>
-            </p:nvPicPr>
-            <p:blipFill>
-              <a:blip r:embed="rId3"/>
-              <a:srcRect l="12091" b="18823"/>
-              <a:stretch/>
-            </p:blipFill>
-            <p:spPr>
-              <a:xfrm>
-                <a:off x="870154" y="3219942"/>
-                <a:ext cx="1883625" cy="1920067"/>
-              </a:xfrm>
-              <a:prstGeom prst="rect">
-                <a:avLst/>
-              </a:prstGeom>
-            </p:spPr>
-          </p:pic>
-          <p:sp>
-            <p:nvSpPr>
-              <p:cNvPr id="20" name="TextBox 19">
-                <a:extLst>
-                  <a:ext uri="{FF2B5EF4-FFF2-40B4-BE49-F238E27FC236}">
-                    <a16:creationId xmlns:a16="http://schemas.microsoft.com/office/drawing/2014/main" id="{CBC06783-9D52-D0EB-2E76-69C6BA35DE22}"/>
-                  </a:ext>
-                </a:extLst>
-              </p:cNvPr>
-              <p:cNvSpPr txBox="1"/>
-              <p:nvPr/>
-            </p:nvSpPr>
-            <p:spPr>
-              <a:xfrm>
-                <a:off x="1781530" y="3197251"/>
-                <a:ext cx="453249" cy="261610"/>
-              </a:xfrm>
-              <a:prstGeom prst="rect">
-                <a:avLst/>
-              </a:prstGeom>
-              <a:noFill/>
-            </p:spPr>
-            <p:txBody>
-              <a:bodyPr wrap="square" rtlCol="0">
-                <a:spAutoFit/>
-              </a:bodyPr>
-              <a:lstStyle/>
-              <a:p>
-                <a:r>
-                  <a:rPr lang="en-US" sz="1100" dirty="0"/>
-                  <a:t>age</a:t>
-                </a:r>
-              </a:p>
-            </p:txBody>
-          </p:sp>
-        </p:grpSp>
-        <p:grpSp>
-          <p:nvGrpSpPr>
-            <p:cNvPr id="19" name="Group 18">
+            <a:prstGeom prst="rect">
+              <a:avLst/>
+            </a:prstGeom>
+          </p:spPr>
+        </p:pic>
+        <p:sp>
+          <p:nvSpPr>
+            <p:cNvPr id="14" name="TextBox 13">
               <a:extLst>
                 <a:ext uri="{FF2B5EF4-FFF2-40B4-BE49-F238E27FC236}">
-                  <a16:creationId xmlns:a16="http://schemas.microsoft.com/office/drawing/2014/main" id="{04442A83-E53C-F324-5D2B-387383FC4191}"/>
+                  <a16:creationId xmlns:a16="http://schemas.microsoft.com/office/drawing/2014/main" id="{A0DCD34E-245A-B39F-B3A9-3872C9FB9EC5}"/>
                 </a:ext>
               </a:extLst>
             </p:cNvPr>
-            <p:cNvGrpSpPr/>
+            <p:cNvSpPr txBox="1"/>
             <p:nvPr/>
-          </p:nvGrpSpPr>
-          <p:grpSpPr>
+          </p:nvSpPr>
+          <p:spPr>
             <a:xfrm>
-              <a:off x="2800882" y="3197251"/>
-              <a:ext cx="1168736" cy="2029046"/>
-              <a:chOff x="2746615" y="3197251"/>
-              <a:chExt cx="1168736" cy="2029046"/>
+              <a:off x="5247713" y="5218848"/>
+              <a:ext cx="4974970" cy="307777"/>
             </a:xfrm>
-          </p:grpSpPr>
-          <p:pic>
-            <p:nvPicPr>
-              <p:cNvPr id="16" name="Picture 15">
-                <a:extLst>
-                  <a:ext uri="{FF2B5EF4-FFF2-40B4-BE49-F238E27FC236}">
-                    <a16:creationId xmlns:a16="http://schemas.microsoft.com/office/drawing/2014/main" id="{378A7179-3DAB-50FC-4764-F49BAE72B01F}"/>
-                  </a:ext>
-                </a:extLst>
-              </p:cNvPr>
-              <p:cNvPicPr>
-                <a:picLocks noChangeAspect="1"/>
-              </p:cNvPicPr>
-              <p:nvPr/>
-            </p:nvPicPr>
-            <p:blipFill>
-              <a:blip r:embed="rId4"/>
-              <a:srcRect l="26686"/>
-              <a:stretch/>
-            </p:blipFill>
-            <p:spPr>
-              <a:xfrm>
-                <a:off x="2746615" y="3233605"/>
-                <a:ext cx="1168736" cy="1992692"/>
-              </a:xfrm>
-              <a:prstGeom prst="rect">
-                <a:avLst/>
-              </a:prstGeom>
-            </p:spPr>
-          </p:pic>
-          <p:sp>
-            <p:nvSpPr>
-              <p:cNvPr id="9" name="TextBox 8">
-                <a:extLst>
-                  <a:ext uri="{FF2B5EF4-FFF2-40B4-BE49-F238E27FC236}">
-                    <a16:creationId xmlns:a16="http://schemas.microsoft.com/office/drawing/2014/main" id="{4C488C42-DA4A-6C1E-FA2E-C56DCC8B2907}"/>
-                  </a:ext>
-                </a:extLst>
-              </p:cNvPr>
-              <p:cNvSpPr txBox="1"/>
-              <p:nvPr/>
-            </p:nvSpPr>
-            <p:spPr>
-              <a:xfrm>
-                <a:off x="3197720" y="3197251"/>
-                <a:ext cx="577898" cy="261610"/>
-              </a:xfrm>
-              <a:prstGeom prst="rect">
-                <a:avLst/>
-              </a:prstGeom>
-              <a:noFill/>
-            </p:spPr>
-            <p:txBody>
-              <a:bodyPr wrap="square" rtlCol="0">
-                <a:spAutoFit/>
-              </a:bodyPr>
-              <a:lstStyle/>
-              <a:p>
-                <a:r>
-                  <a:rPr lang="en-US" sz="1100" dirty="0"/>
-                  <a:t>race</a:t>
-                </a:r>
-              </a:p>
-            </p:txBody>
-          </p:sp>
-        </p:grpSp>
-        <p:grpSp>
-          <p:nvGrpSpPr>
-            <p:cNvPr id="3" name="Group 2">
+            <a:prstGeom prst="rect">
+              <a:avLst/>
+            </a:prstGeom>
+            <a:noFill/>
+          </p:spPr>
+          <p:txBody>
+            <a:bodyPr wrap="square" rtlCol="0">
+              <a:spAutoFit/>
+            </a:bodyPr>
+            <a:lstStyle/>
+            <a:p>
+              <a:r>
+                <a:rPr lang="en-US" sz="1400" dirty="0"/>
+                <a:t>(c) significance heatmaps: pair-wise comparison of algorithms</a:t>
+              </a:r>
+            </a:p>
+          </p:txBody>
+        </p:sp>
+      </p:grpSp>
+      <p:grpSp>
+        <p:nvGrpSpPr>
+          <p:cNvPr id="21" name="Group 20">
+            <a:extLst>
+              <a:ext uri="{FF2B5EF4-FFF2-40B4-BE49-F238E27FC236}">
+                <a16:creationId xmlns:a16="http://schemas.microsoft.com/office/drawing/2014/main" id="{A60D2BFB-0F3A-CD93-F020-343E27120D07}"/>
+              </a:ext>
+            </a:extLst>
+          </p:cNvPr>
+          <p:cNvGrpSpPr/>
+          <p:nvPr/>
+        </p:nvGrpSpPr>
+        <p:grpSpPr>
+          <a:xfrm>
+            <a:off x="621336" y="3197251"/>
+            <a:ext cx="4974970" cy="2329374"/>
+            <a:chOff x="621336" y="3197251"/>
+            <a:chExt cx="4974970" cy="2329374"/>
+          </a:xfrm>
+        </p:grpSpPr>
+        <p:pic>
+          <p:nvPicPr>
+            <p:cNvPr id="7" name="Picture 6">
               <a:extLst>
                 <a:ext uri="{FF2B5EF4-FFF2-40B4-BE49-F238E27FC236}">
-                  <a16:creationId xmlns:a16="http://schemas.microsoft.com/office/drawing/2014/main" id="{F16E5981-F4AF-1C7A-E3D0-1E14C8716165}"/>
+                  <a16:creationId xmlns:a16="http://schemas.microsoft.com/office/drawing/2014/main" id="{E8BEE714-789E-FE90-A1C7-AC260419A9ED}"/>
                 </a:ext>
               </a:extLst>
             </p:cNvPr>
-            <p:cNvGrpSpPr/>
+            <p:cNvPicPr>
+              <a:picLocks noChangeAspect="1"/>
+            </p:cNvPicPr>
             <p:nvPr/>
-          </p:nvGrpSpPr>
-          <p:grpSpPr>
+          </p:nvPicPr>
+          <p:blipFill>
+            <a:blip r:embed="rId3"/>
+            <a:srcRect l="11482" t="3602" r="206" b="20190"/>
+            <a:stretch/>
+          </p:blipFill>
+          <p:spPr>
             <a:xfrm>
-              <a:off x="4016721" y="3197251"/>
-              <a:ext cx="536325" cy="1909213"/>
-              <a:chOff x="3908187" y="3197251"/>
-              <a:chExt cx="536325" cy="1909213"/>
+              <a:off x="862780" y="3287360"/>
+              <a:ext cx="1912949" cy="1822280"/>
             </a:xfrm>
-          </p:grpSpPr>
-          <p:pic>
-            <p:nvPicPr>
-              <p:cNvPr id="18" name="Picture 17">
-                <a:extLst>
-                  <a:ext uri="{FF2B5EF4-FFF2-40B4-BE49-F238E27FC236}">
-                    <a16:creationId xmlns:a16="http://schemas.microsoft.com/office/drawing/2014/main" id="{37B142F6-2A15-D83D-29F3-EEAC45E7397A}"/>
-                  </a:ext>
-                </a:extLst>
-              </p:cNvPr>
-              <p:cNvPicPr>
-                <a:picLocks noChangeAspect="1"/>
-              </p:cNvPicPr>
-              <p:nvPr/>
-            </p:nvPicPr>
-            <p:blipFill>
-              <a:blip r:embed="rId5"/>
-              <a:srcRect l="45966" t="3563" b="2572"/>
-              <a:stretch/>
-            </p:blipFill>
-            <p:spPr>
-              <a:xfrm>
-                <a:off x="3908187" y="3305096"/>
-                <a:ext cx="512382" cy="1801368"/>
-              </a:xfrm>
-              <a:prstGeom prst="rect">
-                <a:avLst/>
-              </a:prstGeom>
-            </p:spPr>
-          </p:pic>
-          <p:sp>
-            <p:nvSpPr>
-              <p:cNvPr id="11" name="TextBox 10">
-                <a:extLst>
-                  <a:ext uri="{FF2B5EF4-FFF2-40B4-BE49-F238E27FC236}">
-                    <a16:creationId xmlns:a16="http://schemas.microsoft.com/office/drawing/2014/main" id="{0102A234-9C79-B32D-D57A-04EE4B75BE10}"/>
-                  </a:ext>
-                </a:extLst>
-              </p:cNvPr>
-              <p:cNvSpPr txBox="1"/>
-              <p:nvPr/>
-            </p:nvSpPr>
-            <p:spPr>
-              <a:xfrm>
-                <a:off x="3991263" y="3197251"/>
-                <a:ext cx="453249" cy="261610"/>
-              </a:xfrm>
-              <a:prstGeom prst="rect">
-                <a:avLst/>
-              </a:prstGeom>
-              <a:noFill/>
-            </p:spPr>
-            <p:txBody>
-              <a:bodyPr wrap="square" rtlCol="0">
-                <a:spAutoFit/>
-              </a:bodyPr>
-              <a:lstStyle/>
-              <a:p>
-                <a:r>
-                  <a:rPr lang="en-US" sz="1100" dirty="0"/>
-                  <a:t>sex</a:t>
-                </a:r>
-              </a:p>
-            </p:txBody>
-          </p:sp>
-        </p:grpSp>
-        <p:grpSp>
-          <p:nvGrpSpPr>
-            <p:cNvPr id="23" name="Group 22">
+            <a:prstGeom prst="rect">
+              <a:avLst/>
+            </a:prstGeom>
+          </p:spPr>
+        </p:pic>
+        <p:sp>
+          <p:nvSpPr>
+            <p:cNvPr id="20" name="TextBox 19">
               <a:extLst>
                 <a:ext uri="{FF2B5EF4-FFF2-40B4-BE49-F238E27FC236}">
-                  <a16:creationId xmlns:a16="http://schemas.microsoft.com/office/drawing/2014/main" id="{31B03E90-3FCF-26A9-62AB-E45C61D629CC}"/>
+                  <a16:creationId xmlns:a16="http://schemas.microsoft.com/office/drawing/2014/main" id="{CBC06783-9D52-D0EB-2E76-69C6BA35DE22}"/>
                 </a:ext>
               </a:extLst>
             </p:cNvPr>
-            <p:cNvGrpSpPr/>
+            <p:cNvSpPr txBox="1"/>
             <p:nvPr/>
-          </p:nvGrpSpPr>
-          <p:grpSpPr>
+          </p:nvSpPr>
+          <p:spPr>
+            <a:xfrm>
+              <a:off x="1781530" y="3197251"/>
+              <a:ext cx="453249" cy="261610"/>
+            </a:xfrm>
+            <a:prstGeom prst="rect">
+              <a:avLst/>
+            </a:prstGeom>
+            <a:noFill/>
+          </p:spPr>
+          <p:txBody>
+            <a:bodyPr wrap="square" rtlCol="0">
+              <a:spAutoFit/>
+            </a:bodyPr>
+            <a:lstStyle/>
+            <a:p>
+              <a:r>
+                <a:rPr lang="en-US" sz="1100" dirty="0"/>
+                <a:t>age</a:t>
+              </a:r>
+            </a:p>
+          </p:txBody>
+        </p:sp>
+        <p:pic>
+          <p:nvPicPr>
+            <p:cNvPr id="16" name="Picture 15">
+              <a:extLst>
+                <a:ext uri="{FF2B5EF4-FFF2-40B4-BE49-F238E27FC236}">
+                  <a16:creationId xmlns:a16="http://schemas.microsoft.com/office/drawing/2014/main" id="{378A7179-3DAB-50FC-4764-F49BAE72B01F}"/>
+                </a:ext>
+              </a:extLst>
+            </p:cNvPr>
+            <p:cNvPicPr>
+              <a:picLocks noChangeAspect="1"/>
+            </p:cNvPicPr>
+            <p:nvPr/>
+          </p:nvPicPr>
+          <p:blipFill>
+            <a:blip r:embed="rId4"/>
+            <a:srcRect l="28111" t="18" b="18"/>
+            <a:stretch/>
+          </p:blipFill>
+          <p:spPr>
+            <a:xfrm>
+              <a:off x="2823194" y="3225129"/>
+              <a:ext cx="1156779" cy="2010693"/>
+            </a:xfrm>
+            <a:prstGeom prst="rect">
+              <a:avLst/>
+            </a:prstGeom>
+          </p:spPr>
+        </p:pic>
+        <p:sp>
+          <p:nvSpPr>
+            <p:cNvPr id="9" name="TextBox 8">
+              <a:extLst>
+                <a:ext uri="{FF2B5EF4-FFF2-40B4-BE49-F238E27FC236}">
+                  <a16:creationId xmlns:a16="http://schemas.microsoft.com/office/drawing/2014/main" id="{4C488C42-DA4A-6C1E-FA2E-C56DCC8B2907}"/>
+                </a:ext>
+              </a:extLst>
+            </p:cNvPr>
+            <p:cNvSpPr txBox="1"/>
+            <p:nvPr/>
+          </p:nvSpPr>
+          <p:spPr>
+            <a:xfrm>
+              <a:off x="3251987" y="3197251"/>
+              <a:ext cx="577898" cy="261610"/>
+            </a:xfrm>
+            <a:prstGeom prst="rect">
+              <a:avLst/>
+            </a:prstGeom>
+            <a:noFill/>
+          </p:spPr>
+          <p:txBody>
+            <a:bodyPr wrap="square" rtlCol="0">
+              <a:spAutoFit/>
+            </a:bodyPr>
+            <a:lstStyle/>
+            <a:p>
+              <a:r>
+                <a:rPr lang="en-US" sz="1100" dirty="0"/>
+                <a:t>race</a:t>
+              </a:r>
+            </a:p>
+          </p:txBody>
+        </p:sp>
+        <p:pic>
+          <p:nvPicPr>
+            <p:cNvPr id="18" name="Picture 17">
+              <a:extLst>
+                <a:ext uri="{FF2B5EF4-FFF2-40B4-BE49-F238E27FC236}">
+                  <a16:creationId xmlns:a16="http://schemas.microsoft.com/office/drawing/2014/main" id="{37B142F6-2A15-D83D-29F3-EEAC45E7397A}"/>
+                </a:ext>
+              </a:extLst>
+            </p:cNvPr>
+            <p:cNvPicPr>
+              <a:picLocks noChangeAspect="1"/>
+            </p:cNvPicPr>
+            <p:nvPr/>
+          </p:nvPicPr>
+          <p:blipFill>
+            <a:blip r:embed="rId5"/>
+            <a:srcRect l="46332" t="3916" b="213"/>
+            <a:stretch/>
+          </p:blipFill>
+          <p:spPr>
+            <a:xfrm>
+              <a:off x="4017081" y="3305095"/>
+              <a:ext cx="512022" cy="1851105"/>
+            </a:xfrm>
+            <a:prstGeom prst="rect">
+              <a:avLst/>
+            </a:prstGeom>
+          </p:spPr>
+        </p:pic>
+        <p:sp>
+          <p:nvSpPr>
+            <p:cNvPr id="11" name="TextBox 10">
+              <a:extLst>
+                <a:ext uri="{FF2B5EF4-FFF2-40B4-BE49-F238E27FC236}">
+                  <a16:creationId xmlns:a16="http://schemas.microsoft.com/office/drawing/2014/main" id="{0102A234-9C79-B32D-D57A-04EE4B75BE10}"/>
+                </a:ext>
+              </a:extLst>
+            </p:cNvPr>
+            <p:cNvSpPr txBox="1"/>
+            <p:nvPr/>
+          </p:nvSpPr>
+          <p:spPr>
+            <a:xfrm>
+              <a:off x="4099797" y="3197251"/>
+              <a:ext cx="453249" cy="261610"/>
+            </a:xfrm>
+            <a:prstGeom prst="rect">
+              <a:avLst/>
+            </a:prstGeom>
+            <a:noFill/>
+          </p:spPr>
+          <p:txBody>
+            <a:bodyPr wrap="square" rtlCol="0">
+              <a:spAutoFit/>
+            </a:bodyPr>
+            <a:lstStyle/>
+            <a:p>
+              <a:r>
+                <a:rPr lang="en-US" sz="1100" dirty="0"/>
+                <a:t>sex</a:t>
+              </a:r>
+            </a:p>
+          </p:txBody>
+        </p:sp>
+        <p:pic>
+          <p:nvPicPr>
+            <p:cNvPr id="10" name="Picture 9">
+              <a:extLst>
+                <a:ext uri="{FF2B5EF4-FFF2-40B4-BE49-F238E27FC236}">
+                  <a16:creationId xmlns:a16="http://schemas.microsoft.com/office/drawing/2014/main" id="{5DFB2FFE-6EEA-87BC-D4CD-04FF1E8564DC}"/>
+                </a:ext>
+              </a:extLst>
+            </p:cNvPr>
+            <p:cNvPicPr>
+              <a:picLocks noChangeAspect="1"/>
+            </p:cNvPicPr>
+            <p:nvPr/>
+          </p:nvPicPr>
+          <p:blipFill>
+            <a:blip r:embed="rId6"/>
+            <a:srcRect l="45936" r="574"/>
+            <a:stretch/>
+          </p:blipFill>
+          <p:spPr>
+            <a:xfrm>
+              <a:off x="4609332" y="3222071"/>
+              <a:ext cx="555665" cy="2102404"/>
+            </a:xfrm>
+            <a:prstGeom prst="rect">
+              <a:avLst/>
+            </a:prstGeom>
+          </p:spPr>
+        </p:pic>
+        <p:sp>
+          <p:nvSpPr>
+            <p:cNvPr id="29" name="TextBox 28">
+              <a:extLst>
+                <a:ext uri="{FF2B5EF4-FFF2-40B4-BE49-F238E27FC236}">
+                  <a16:creationId xmlns:a16="http://schemas.microsoft.com/office/drawing/2014/main" id="{54476243-818E-D328-7729-450DAF5D9CAF}"/>
+                </a:ext>
+              </a:extLst>
+            </p:cNvPr>
+            <p:cNvSpPr txBox="1"/>
+            <p:nvPr/>
+          </p:nvSpPr>
+          <p:spPr>
             <a:xfrm>
               <a:off x="4590154" y="3197251"/>
-              <a:ext cx="672794" cy="2042211"/>
-              <a:chOff x="4590154" y="3197251"/>
-              <a:chExt cx="672794" cy="2042211"/>
+              <a:ext cx="672794" cy="261610"/>
             </a:xfrm>
-          </p:grpSpPr>
-          <p:pic>
-            <p:nvPicPr>
-              <p:cNvPr id="10" name="Picture 9">
-                <a:extLst>
-                  <a:ext uri="{FF2B5EF4-FFF2-40B4-BE49-F238E27FC236}">
-                    <a16:creationId xmlns:a16="http://schemas.microsoft.com/office/drawing/2014/main" id="{5DFB2FFE-6EEA-87BC-D4CD-04FF1E8564DC}"/>
-                  </a:ext>
-                </a:extLst>
-              </p:cNvPr>
-              <p:cNvPicPr>
-                <a:picLocks noChangeAspect="1"/>
-              </p:cNvPicPr>
-              <p:nvPr/>
-            </p:nvPicPr>
-            <p:blipFill>
-              <a:blip r:embed="rId6"/>
-              <a:srcRect l="45492" t="5788" r="-1" b="3710"/>
-              <a:stretch/>
-            </p:blipFill>
-            <p:spPr>
-              <a:xfrm>
-                <a:off x="4601695" y="3346654"/>
-                <a:ext cx="563302" cy="1892808"/>
-              </a:xfrm>
-              <a:prstGeom prst="rect">
-                <a:avLst/>
-              </a:prstGeom>
-            </p:spPr>
-          </p:pic>
-          <p:sp>
-            <p:nvSpPr>
-              <p:cNvPr id="29" name="TextBox 28">
-                <a:extLst>
-                  <a:ext uri="{FF2B5EF4-FFF2-40B4-BE49-F238E27FC236}">
-                    <a16:creationId xmlns:a16="http://schemas.microsoft.com/office/drawing/2014/main" id="{54476243-818E-D328-7729-450DAF5D9CAF}"/>
-                  </a:ext>
-                </a:extLst>
-              </p:cNvPr>
-              <p:cNvSpPr txBox="1"/>
-              <p:nvPr/>
-            </p:nvSpPr>
-            <p:spPr>
-              <a:xfrm>
-                <a:off x="4590154" y="3197251"/>
-                <a:ext cx="672794" cy="261610"/>
-              </a:xfrm>
-              <a:prstGeom prst="rect">
-                <a:avLst/>
-              </a:prstGeom>
-              <a:noFill/>
-            </p:spPr>
-            <p:txBody>
-              <a:bodyPr wrap="square" rtlCol="0">
-                <a:spAutoFit/>
-              </a:bodyPr>
-              <a:lstStyle/>
-              <a:p>
-                <a:r>
-                  <a:rPr lang="en-US" sz="1100" dirty="0"/>
-                  <a:t>cancer</a:t>
-                </a:r>
-              </a:p>
-            </p:txBody>
-          </p:sp>
-        </p:grpSp>
+            <a:prstGeom prst="rect">
+              <a:avLst/>
+            </a:prstGeom>
+            <a:noFill/>
+          </p:spPr>
+          <p:txBody>
+            <a:bodyPr wrap="square" rtlCol="0">
+              <a:spAutoFit/>
+            </a:bodyPr>
+            <a:lstStyle/>
+            <a:p>
+              <a:r>
+                <a:rPr lang="en-US" sz="1100" dirty="0"/>
+                <a:t>cancer</a:t>
+              </a:r>
+            </a:p>
+          </p:txBody>
+        </p:sp>
+        <p:sp>
+          <p:nvSpPr>
+            <p:cNvPr id="13" name="TextBox 12">
+              <a:extLst>
+                <a:ext uri="{FF2B5EF4-FFF2-40B4-BE49-F238E27FC236}">
+                  <a16:creationId xmlns:a16="http://schemas.microsoft.com/office/drawing/2014/main" id="{76A3CB56-5665-D2D3-9D67-45B98867F6C0}"/>
+                </a:ext>
+              </a:extLst>
+            </p:cNvPr>
+            <p:cNvSpPr txBox="1"/>
+            <p:nvPr/>
+          </p:nvSpPr>
+          <p:spPr>
+            <a:xfrm>
+              <a:off x="621336" y="5218848"/>
+              <a:ext cx="4974970" cy="307777"/>
+            </a:xfrm>
+            <a:prstGeom prst="rect">
+              <a:avLst/>
+            </a:prstGeom>
+            <a:noFill/>
+          </p:spPr>
+          <p:txBody>
+            <a:bodyPr wrap="square" rtlCol="0">
+              <a:spAutoFit/>
+            </a:bodyPr>
+            <a:lstStyle/>
+            <a:p>
+              <a:r>
+                <a:rPr lang="en-US" sz="1400" dirty="0"/>
+                <a:t>(b) per-group analysis of average DSC across all algorithms</a:t>
+              </a:r>
+            </a:p>
+          </p:txBody>
+        </p:sp>
+        <p:sp>
+          <p:nvSpPr>
+            <p:cNvPr id="8" name="TextBox 7">
+              <a:extLst>
+                <a:ext uri="{FF2B5EF4-FFF2-40B4-BE49-F238E27FC236}">
+                  <a16:creationId xmlns:a16="http://schemas.microsoft.com/office/drawing/2014/main" id="{A662A291-D0CE-29EB-C296-4E053DCEBA48}"/>
+                </a:ext>
+              </a:extLst>
+            </p:cNvPr>
+            <p:cNvSpPr txBox="1"/>
+            <p:nvPr/>
+          </p:nvSpPr>
+          <p:spPr>
+            <a:xfrm>
+              <a:off x="621336" y="3743635"/>
+              <a:ext cx="353943" cy="433386"/>
+            </a:xfrm>
+            <a:prstGeom prst="rect">
+              <a:avLst/>
+            </a:prstGeom>
+            <a:noFill/>
+          </p:spPr>
+          <p:txBody>
+            <a:bodyPr vert="vert270" wrap="square" rtlCol="0">
+              <a:spAutoFit/>
+            </a:bodyPr>
+            <a:lstStyle/>
+            <a:p>
+              <a:r>
+                <a:rPr lang="en-US" sz="1100" dirty="0"/>
+                <a:t>DSC</a:t>
+              </a:r>
+            </a:p>
+          </p:txBody>
+        </p:sp>
       </p:grpSp>
       <p:sp>
         <p:nvSpPr>
-          <p:cNvPr id="13" name="TextBox 12">
-            <a:extLst>
-              <a:ext uri="{FF2B5EF4-FFF2-40B4-BE49-F238E27FC236}">
-                <a16:creationId xmlns:a16="http://schemas.microsoft.com/office/drawing/2014/main" id="{76A3CB56-5665-D2D3-9D67-45B98867F6C0}"/>
+          <p:cNvPr id="15" name="TextBox 14">
+            <a:extLst>
+              <a:ext uri="{FF2B5EF4-FFF2-40B4-BE49-F238E27FC236}">
+                <a16:creationId xmlns:a16="http://schemas.microsoft.com/office/drawing/2014/main" id="{332E66BF-7A3D-F69D-FC16-B03920F0BC33}"/>
               </a:ext>
             </a:extLst>
           </p:cNvPr>
@@ -3797,106 +3803,7 @@
         </p:nvSpPr>
         <p:spPr>
           <a:xfrm>
-            <a:off x="621336" y="5218848"/>
-            <a:ext cx="4974970" cy="307777"/>
-          </a:xfrm>
-          <a:prstGeom prst="rect">
-            <a:avLst/>
-          </a:prstGeom>
-          <a:noFill/>
-        </p:spPr>
-        <p:txBody>
-          <a:bodyPr wrap="square" rtlCol="0">
-            <a:spAutoFit/>
-          </a:bodyPr>
-          <a:lstStyle/>
-          <a:p>
-            <a:r>
-              <a:rPr lang="en-US" sz="1400" dirty="0"/>
-              <a:t>(b) per-group analysis of average DSC across all algorithms</a:t>
-            </a:r>
-          </a:p>
-        </p:txBody>
-      </p:sp>
-      <p:sp>
-        <p:nvSpPr>
-          <p:cNvPr id="14" name="TextBox 13">
-            <a:extLst>
-              <a:ext uri="{FF2B5EF4-FFF2-40B4-BE49-F238E27FC236}">
-                <a16:creationId xmlns:a16="http://schemas.microsoft.com/office/drawing/2014/main" id="{A0DCD34E-245A-B39F-B3A9-3872C9FB9EC5}"/>
-              </a:ext>
-            </a:extLst>
-          </p:cNvPr>
-          <p:cNvSpPr txBox="1"/>
-          <p:nvPr/>
-        </p:nvSpPr>
-        <p:spPr>
-          <a:xfrm>
-            <a:off x="5247713" y="5218848"/>
-            <a:ext cx="4974970" cy="307777"/>
-          </a:xfrm>
-          <a:prstGeom prst="rect">
-            <a:avLst/>
-          </a:prstGeom>
-          <a:noFill/>
-        </p:spPr>
-        <p:txBody>
-          <a:bodyPr wrap="square" rtlCol="0">
-            <a:spAutoFit/>
-          </a:bodyPr>
-          <a:lstStyle/>
-          <a:p>
-            <a:r>
-              <a:rPr lang="en-US" sz="1400" dirty="0"/>
-              <a:t>(c) significance heatmaps: pair-wise comparison of algorithms</a:t>
-            </a:r>
-          </a:p>
-        </p:txBody>
-      </p:sp>
-      <p:pic>
-        <p:nvPicPr>
-          <p:cNvPr id="4" name="Picture 3">
-            <a:extLst>
-              <a:ext uri="{FF2B5EF4-FFF2-40B4-BE49-F238E27FC236}">
-                <a16:creationId xmlns:a16="http://schemas.microsoft.com/office/drawing/2014/main" id="{201D7BC7-8C3D-D941-E686-9845C4EEC5E8}"/>
-              </a:ext>
-            </a:extLst>
-          </p:cNvPr>
-          <p:cNvPicPr>
-            <a:picLocks noChangeAspect="1"/>
-          </p:cNvPicPr>
-          <p:nvPr/>
-        </p:nvPicPr>
-        <p:blipFill>
-          <a:blip r:embed="rId7"/>
-          <a:srcRect l="3806" t="2500" r="1623" b="3112"/>
-          <a:stretch/>
-        </p:blipFill>
-        <p:spPr>
-          <a:xfrm>
-            <a:off x="856300" y="447220"/>
-            <a:ext cx="4239719" cy="2505313"/>
-          </a:xfrm>
-          <a:prstGeom prst="rect">
-            <a:avLst/>
-          </a:prstGeom>
-        </p:spPr>
-      </p:pic>
-      <p:sp>
-        <p:nvSpPr>
-          <p:cNvPr id="8" name="TextBox 7">
-            <a:extLst>
-              <a:ext uri="{FF2B5EF4-FFF2-40B4-BE49-F238E27FC236}">
-                <a16:creationId xmlns:a16="http://schemas.microsoft.com/office/drawing/2014/main" id="{A662A291-D0CE-29EB-C296-4E053DCEBA48}"/>
-              </a:ext>
-            </a:extLst>
-          </p:cNvPr>
-          <p:cNvSpPr txBox="1"/>
-          <p:nvPr/>
-        </p:nvSpPr>
-        <p:spPr>
-          <a:xfrm>
-            <a:off x="621336" y="3743635"/>
+            <a:off x="621336" y="910435"/>
             <a:ext cx="353943" cy="433386"/>
           </a:xfrm>
           <a:prstGeom prst="rect">
@@ -3917,41 +3824,91 @@
           </a:p>
         </p:txBody>
       </p:sp>
-      <p:sp>
-        <p:nvSpPr>
-          <p:cNvPr id="15" name="TextBox 14">
-            <a:extLst>
-              <a:ext uri="{FF2B5EF4-FFF2-40B4-BE49-F238E27FC236}">
-                <a16:creationId xmlns:a16="http://schemas.microsoft.com/office/drawing/2014/main" id="{332E66BF-7A3D-F69D-FC16-B03920F0BC33}"/>
-              </a:ext>
-            </a:extLst>
-          </p:cNvPr>
-          <p:cNvSpPr txBox="1"/>
+      <p:grpSp>
+        <p:nvGrpSpPr>
+          <p:cNvPr id="22" name="Group 21">
+            <a:extLst>
+              <a:ext uri="{FF2B5EF4-FFF2-40B4-BE49-F238E27FC236}">
+                <a16:creationId xmlns:a16="http://schemas.microsoft.com/office/drawing/2014/main" id="{338E7C38-DD51-FEF2-705A-3FAFE3F1F9E4}"/>
+              </a:ext>
+            </a:extLst>
+          </p:cNvPr>
+          <p:cNvGrpSpPr/>
           <p:nvPr/>
-        </p:nvSpPr>
-        <p:spPr>
+        </p:nvGrpSpPr>
+        <p:grpSpPr>
           <a:xfrm>
-            <a:off x="621336" y="967261"/>
-            <a:ext cx="353943" cy="433386"/>
+            <a:off x="935552" y="429950"/>
+            <a:ext cx="4149446" cy="2775923"/>
+            <a:chOff x="935552" y="429950"/>
+            <a:chExt cx="4149446" cy="2775923"/>
           </a:xfrm>
-          <a:prstGeom prst="rect">
-            <a:avLst/>
-          </a:prstGeom>
-          <a:noFill/>
-        </p:spPr>
-        <p:txBody>
-          <a:bodyPr vert="vert270" wrap="square" rtlCol="0">
-            <a:spAutoFit/>
-          </a:bodyPr>
-          <a:lstStyle/>
-          <a:p>
-            <a:r>
-              <a:rPr lang="en-US" sz="1100" dirty="0"/>
-              <a:t>DSC</a:t>
-            </a:r>
-          </a:p>
-        </p:txBody>
-      </p:sp>
+        </p:grpSpPr>
+        <p:sp>
+          <p:nvSpPr>
+            <p:cNvPr id="12" name="TextBox 11">
+              <a:extLst>
+                <a:ext uri="{FF2B5EF4-FFF2-40B4-BE49-F238E27FC236}">
+                  <a16:creationId xmlns:a16="http://schemas.microsoft.com/office/drawing/2014/main" id="{9E30DB82-7CC0-9574-6B21-C40831B9CA54}"/>
+                </a:ext>
+              </a:extLst>
+            </p:cNvPr>
+            <p:cNvSpPr txBox="1"/>
+            <p:nvPr/>
+          </p:nvSpPr>
+          <p:spPr>
+            <a:xfrm>
+              <a:off x="1023687" y="2898096"/>
+              <a:ext cx="3904945" cy="307777"/>
+            </a:xfrm>
+            <a:prstGeom prst="rect">
+              <a:avLst/>
+            </a:prstGeom>
+            <a:noFill/>
+          </p:spPr>
+          <p:txBody>
+            <a:bodyPr wrap="square" rtlCol="0">
+              <a:spAutoFit/>
+            </a:bodyPr>
+            <a:lstStyle/>
+            <a:p>
+              <a:r>
+                <a:rPr lang="en-US" sz="1400" dirty="0"/>
+                <a:t>(a) overall analysis of per-algorithm average DSC</a:t>
+              </a:r>
+            </a:p>
+          </p:txBody>
+        </p:sp>
+        <p:pic>
+          <p:nvPicPr>
+            <p:cNvPr id="6" name="Picture 5">
+              <a:extLst>
+                <a:ext uri="{FF2B5EF4-FFF2-40B4-BE49-F238E27FC236}">
+                  <a16:creationId xmlns:a16="http://schemas.microsoft.com/office/drawing/2014/main" id="{0EB394DE-5DB2-AC0C-4F7F-0343BFFC28DD}"/>
+                </a:ext>
+              </a:extLst>
+            </p:cNvPr>
+            <p:cNvPicPr>
+              <a:picLocks noChangeAspect="1"/>
+            </p:cNvPicPr>
+            <p:nvPr/>
+          </p:nvPicPr>
+          <p:blipFill>
+            <a:blip r:embed="rId7"/>
+            <a:srcRect l="5432" t="2975" r="2009" b="2968"/>
+            <a:stretch/>
+          </p:blipFill>
+          <p:spPr>
+            <a:xfrm>
+              <a:off x="935552" y="429950"/>
+              <a:ext cx="4149446" cy="2496562"/>
+            </a:xfrm>
+            <a:prstGeom prst="rect">
+              <a:avLst/>
+            </a:prstGeom>
+          </p:spPr>
+        </p:pic>
+      </p:grpSp>
     </p:spTree>
     <p:extLst>
       <p:ext uri="{BB962C8B-B14F-4D97-AF65-F5344CB8AC3E}">

</xml_diff>

<commit_message>
Update the background of JHH figure
</commit_message>
<xml_diff>
--- a/utils/JHHAnalysis.pptx
+++ b/utils/JHHAnalysis.pptx
@@ -5,7 +5,7 @@
     <p:sldMasterId id="2147483648" r:id="rId1"/>
   </p:sldMasterIdLst>
   <p:sldIdLst>
-    <p:sldId id="263" r:id="rId2"/>
+    <p:sldId id="264" r:id="rId2"/>
   </p:sldIdLst>
   <p:sldSz cx="12192000" cy="6858000"/>
   <p:notesSz cx="6858000" cy="9144000"/>
@@ -3357,12 +3357,66 @@
           <a:chExt cx="0" cy="0"/>
         </a:xfrm>
       </p:grpSpPr>
+      <p:sp>
+        <p:nvSpPr>
+          <p:cNvPr id="2" name="Rectangle 1">
+            <a:extLst>
+              <a:ext uri="{FF2B5EF4-FFF2-40B4-BE49-F238E27FC236}">
+                <a16:creationId xmlns:a16="http://schemas.microsoft.com/office/drawing/2014/main" id="{3E5F2E8C-729A-139D-C2E8-9CC84805A2BE}"/>
+              </a:ext>
+            </a:extLst>
+          </p:cNvPr>
+          <p:cNvSpPr/>
+          <p:nvPr/>
+        </p:nvSpPr>
+        <p:spPr>
+          <a:xfrm>
+            <a:off x="882110" y="843578"/>
+            <a:ext cx="9601200" cy="5120640"/>
+          </a:xfrm>
+          <a:prstGeom prst="rect">
+            <a:avLst/>
+          </a:prstGeom>
+          <a:solidFill>
+            <a:schemeClr val="bg1"/>
+          </a:solidFill>
+          <a:ln>
+            <a:solidFill>
+              <a:schemeClr val="bg1"/>
+            </a:solidFill>
+          </a:ln>
+        </p:spPr>
+        <p:style>
+          <a:lnRef idx="2">
+            <a:schemeClr val="accent1">
+              <a:shade val="15000"/>
+            </a:schemeClr>
+          </a:lnRef>
+          <a:fillRef idx="1">
+            <a:schemeClr val="accent1"/>
+          </a:fillRef>
+          <a:effectRef idx="0">
+            <a:schemeClr val="accent1"/>
+          </a:effectRef>
+          <a:fontRef idx="minor">
+            <a:schemeClr val="lt1"/>
+          </a:fontRef>
+        </p:style>
+        <p:txBody>
+          <a:bodyPr rtlCol="0" anchor="ctr"/>
+          <a:lstStyle/>
+          <a:p>
+            <a:pPr algn="ctr"/>
+            <a:endParaRPr lang="en-US"/>
+          </a:p>
+        </p:txBody>
+      </p:sp>
       <p:grpSp>
         <p:nvGrpSpPr>
-          <p:cNvPr id="25" name="Group 24">
-            <a:extLst>
-              <a:ext uri="{FF2B5EF4-FFF2-40B4-BE49-F238E27FC236}">
-                <a16:creationId xmlns:a16="http://schemas.microsoft.com/office/drawing/2014/main" id="{7D07043D-DFE7-1EC9-BE23-414D3BE02E4A}"/>
+          <p:cNvPr id="5" name="Group 4">
+            <a:extLst>
+              <a:ext uri="{FF2B5EF4-FFF2-40B4-BE49-F238E27FC236}">
+                <a16:creationId xmlns:a16="http://schemas.microsoft.com/office/drawing/2014/main" id="{815F3653-8A76-20AA-DB10-59B3B4E0A63F}"/>
               </a:ext>
             </a:extLst>
           </p:cNvPr>
@@ -3371,47 +3425,450 @@
         </p:nvGrpSpPr>
         <p:grpSpPr>
           <a:xfrm>
-            <a:off x="5247713" y="410209"/>
-            <a:ext cx="4974970" cy="5116416"/>
-            <a:chOff x="5247713" y="410209"/>
-            <a:chExt cx="4974970" cy="5116416"/>
+            <a:off x="901214" y="870792"/>
+            <a:ext cx="9601347" cy="5116416"/>
+            <a:chOff x="922985" y="693544"/>
+            <a:chExt cx="9601347" cy="5116416"/>
           </a:xfrm>
         </p:grpSpPr>
-        <p:pic>
-          <p:nvPicPr>
-            <p:cNvPr id="5" name="Picture 4">
+        <p:grpSp>
+          <p:nvGrpSpPr>
+            <p:cNvPr id="3" name="Group 2">
               <a:extLst>
                 <a:ext uri="{FF2B5EF4-FFF2-40B4-BE49-F238E27FC236}">
-                  <a16:creationId xmlns:a16="http://schemas.microsoft.com/office/drawing/2014/main" id="{34B7F4B9-8780-5AD0-E505-2E842520CD54}"/>
+                  <a16:creationId xmlns:a16="http://schemas.microsoft.com/office/drawing/2014/main" id="{9C44BDB1-C32E-146D-B077-5BC448F79943}"/>
                 </a:ext>
               </a:extLst>
             </p:cNvPr>
-            <p:cNvPicPr>
-              <a:picLocks noChangeAspect="1"/>
-            </p:cNvPicPr>
+            <p:cNvGrpSpPr/>
             <p:nvPr/>
-          </p:nvPicPr>
-          <p:blipFill>
-            <a:blip r:embed="rId2"/>
-            <a:srcRect/>
-            <a:stretch/>
-          </p:blipFill>
-          <p:spPr>
+          </p:nvGrpSpPr>
+          <p:grpSpPr>
             <a:xfrm>
-              <a:off x="5247713" y="410209"/>
-              <a:ext cx="4718812" cy="4798791"/>
+              <a:off x="5549362" y="693544"/>
+              <a:ext cx="4974970" cy="5116416"/>
+              <a:chOff x="5247713" y="410209"/>
+              <a:chExt cx="4974970" cy="5116416"/>
             </a:xfrm>
-            <a:prstGeom prst="rect">
-              <a:avLst/>
-            </a:prstGeom>
-          </p:spPr>
-        </p:pic>
+          </p:grpSpPr>
+          <p:pic>
+            <p:nvPicPr>
+              <p:cNvPr id="4" name="Picture 3">
+                <a:extLst>
+                  <a:ext uri="{FF2B5EF4-FFF2-40B4-BE49-F238E27FC236}">
+                    <a16:creationId xmlns:a16="http://schemas.microsoft.com/office/drawing/2014/main" id="{8C52E5DB-E610-32C7-DDEF-F914DD54F5E9}"/>
+                  </a:ext>
+                </a:extLst>
+              </p:cNvPr>
+              <p:cNvPicPr>
+                <a:picLocks noChangeAspect="1"/>
+              </p:cNvPicPr>
+              <p:nvPr/>
+            </p:nvPicPr>
+            <p:blipFill>
+              <a:blip r:embed="rId2"/>
+              <a:srcRect/>
+              <a:stretch/>
+            </p:blipFill>
+            <p:spPr>
+              <a:xfrm>
+                <a:off x="5247713" y="410209"/>
+                <a:ext cx="4718812" cy="4798791"/>
+              </a:xfrm>
+              <a:prstGeom prst="rect">
+                <a:avLst/>
+              </a:prstGeom>
+            </p:spPr>
+          </p:pic>
+          <p:sp>
+            <p:nvSpPr>
+              <p:cNvPr id="17" name="TextBox 16">
+                <a:extLst>
+                  <a:ext uri="{FF2B5EF4-FFF2-40B4-BE49-F238E27FC236}">
+                    <a16:creationId xmlns:a16="http://schemas.microsoft.com/office/drawing/2014/main" id="{A1C9A423-5D7E-B9EF-9617-AC5EF9005D8B}"/>
+                  </a:ext>
+                </a:extLst>
+              </p:cNvPr>
+              <p:cNvSpPr txBox="1"/>
+              <p:nvPr/>
+            </p:nvSpPr>
+            <p:spPr>
+              <a:xfrm>
+                <a:off x="5247713" y="5218848"/>
+                <a:ext cx="4974970" cy="307777"/>
+              </a:xfrm>
+              <a:prstGeom prst="rect">
+                <a:avLst/>
+              </a:prstGeom>
+              <a:noFill/>
+            </p:spPr>
+            <p:txBody>
+              <a:bodyPr wrap="square" rtlCol="0">
+                <a:spAutoFit/>
+              </a:bodyPr>
+              <a:lstStyle/>
+              <a:p>
+                <a:r>
+                  <a:rPr lang="en-US" sz="1400" dirty="0"/>
+                  <a:t>(c) significance heatmaps: pair-wise comparison of algorithms</a:t>
+                </a:r>
+              </a:p>
+            </p:txBody>
+          </p:sp>
+        </p:grpSp>
+        <p:grpSp>
+          <p:nvGrpSpPr>
+            <p:cNvPr id="19" name="Group 18">
+              <a:extLst>
+                <a:ext uri="{FF2B5EF4-FFF2-40B4-BE49-F238E27FC236}">
+                  <a16:creationId xmlns:a16="http://schemas.microsoft.com/office/drawing/2014/main" id="{939B20E0-8376-B7FA-D8EB-F5CE19F04216}"/>
+                </a:ext>
+              </a:extLst>
+            </p:cNvPr>
+            <p:cNvGrpSpPr/>
+            <p:nvPr/>
+          </p:nvGrpSpPr>
+          <p:grpSpPr>
+            <a:xfrm>
+              <a:off x="922985" y="3480586"/>
+              <a:ext cx="4974970" cy="2329374"/>
+              <a:chOff x="621336" y="3197251"/>
+              <a:chExt cx="4974970" cy="2329374"/>
+            </a:xfrm>
+          </p:grpSpPr>
+          <p:pic>
+            <p:nvPicPr>
+              <p:cNvPr id="23" name="Picture 22">
+                <a:extLst>
+                  <a:ext uri="{FF2B5EF4-FFF2-40B4-BE49-F238E27FC236}">
+                    <a16:creationId xmlns:a16="http://schemas.microsoft.com/office/drawing/2014/main" id="{84258D23-7027-450F-F0C3-E61D55141726}"/>
+                  </a:ext>
+                </a:extLst>
+              </p:cNvPr>
+              <p:cNvPicPr>
+                <a:picLocks noChangeAspect="1"/>
+              </p:cNvPicPr>
+              <p:nvPr/>
+            </p:nvPicPr>
+            <p:blipFill>
+              <a:blip r:embed="rId3"/>
+              <a:srcRect l="11482" t="3602" r="206" b="20190"/>
+              <a:stretch/>
+            </p:blipFill>
+            <p:spPr>
+              <a:xfrm>
+                <a:off x="862780" y="3287360"/>
+                <a:ext cx="1912949" cy="1822280"/>
+              </a:xfrm>
+              <a:prstGeom prst="rect">
+                <a:avLst/>
+              </a:prstGeom>
+            </p:spPr>
+          </p:pic>
+          <p:sp>
+            <p:nvSpPr>
+              <p:cNvPr id="24" name="TextBox 23">
+                <a:extLst>
+                  <a:ext uri="{FF2B5EF4-FFF2-40B4-BE49-F238E27FC236}">
+                    <a16:creationId xmlns:a16="http://schemas.microsoft.com/office/drawing/2014/main" id="{4F4A9D80-55E8-A955-416F-CDF8B94ECD49}"/>
+                  </a:ext>
+                </a:extLst>
+              </p:cNvPr>
+              <p:cNvSpPr txBox="1"/>
+              <p:nvPr/>
+            </p:nvSpPr>
+            <p:spPr>
+              <a:xfrm>
+                <a:off x="1781530" y="3197251"/>
+                <a:ext cx="453249" cy="261610"/>
+              </a:xfrm>
+              <a:prstGeom prst="rect">
+                <a:avLst/>
+              </a:prstGeom>
+              <a:noFill/>
+            </p:spPr>
+            <p:txBody>
+              <a:bodyPr wrap="square" rtlCol="0">
+                <a:spAutoFit/>
+              </a:bodyPr>
+              <a:lstStyle/>
+              <a:p>
+                <a:r>
+                  <a:rPr lang="en-US" sz="1100" dirty="0"/>
+                  <a:t>age</a:t>
+                </a:r>
+              </a:p>
+            </p:txBody>
+          </p:sp>
+          <p:pic>
+            <p:nvPicPr>
+              <p:cNvPr id="26" name="Picture 25">
+                <a:extLst>
+                  <a:ext uri="{FF2B5EF4-FFF2-40B4-BE49-F238E27FC236}">
+                    <a16:creationId xmlns:a16="http://schemas.microsoft.com/office/drawing/2014/main" id="{2194F593-E8DA-BD98-0561-30BF6B91BDC1}"/>
+                  </a:ext>
+                </a:extLst>
+              </p:cNvPr>
+              <p:cNvPicPr>
+                <a:picLocks noChangeAspect="1"/>
+              </p:cNvPicPr>
+              <p:nvPr/>
+            </p:nvPicPr>
+            <p:blipFill>
+              <a:blip r:embed="rId4"/>
+              <a:srcRect l="28111" t="18" b="18"/>
+              <a:stretch/>
+            </p:blipFill>
+            <p:spPr>
+              <a:xfrm>
+                <a:off x="2823194" y="3225129"/>
+                <a:ext cx="1156779" cy="2010693"/>
+              </a:xfrm>
+              <a:prstGeom prst="rect">
+                <a:avLst/>
+              </a:prstGeom>
+            </p:spPr>
+          </p:pic>
+          <p:sp>
+            <p:nvSpPr>
+              <p:cNvPr id="27" name="TextBox 26">
+                <a:extLst>
+                  <a:ext uri="{FF2B5EF4-FFF2-40B4-BE49-F238E27FC236}">
+                    <a16:creationId xmlns:a16="http://schemas.microsoft.com/office/drawing/2014/main" id="{1CF56765-A485-2339-A8E5-7DFDCB3B8201}"/>
+                  </a:ext>
+                </a:extLst>
+              </p:cNvPr>
+              <p:cNvSpPr txBox="1"/>
+              <p:nvPr/>
+            </p:nvSpPr>
+            <p:spPr>
+              <a:xfrm>
+                <a:off x="3251987" y="3197251"/>
+                <a:ext cx="577898" cy="261610"/>
+              </a:xfrm>
+              <a:prstGeom prst="rect">
+                <a:avLst/>
+              </a:prstGeom>
+              <a:noFill/>
+            </p:spPr>
+            <p:txBody>
+              <a:bodyPr wrap="square" rtlCol="0">
+                <a:spAutoFit/>
+              </a:bodyPr>
+              <a:lstStyle/>
+              <a:p>
+                <a:r>
+                  <a:rPr lang="en-US" sz="1100" dirty="0"/>
+                  <a:t>race</a:t>
+                </a:r>
+              </a:p>
+            </p:txBody>
+          </p:sp>
+          <p:pic>
+            <p:nvPicPr>
+              <p:cNvPr id="28" name="Picture 27">
+                <a:extLst>
+                  <a:ext uri="{FF2B5EF4-FFF2-40B4-BE49-F238E27FC236}">
+                    <a16:creationId xmlns:a16="http://schemas.microsoft.com/office/drawing/2014/main" id="{64679975-AB0A-1E47-91F2-351AB235BBB5}"/>
+                  </a:ext>
+                </a:extLst>
+              </p:cNvPr>
+              <p:cNvPicPr>
+                <a:picLocks noChangeAspect="1"/>
+              </p:cNvPicPr>
+              <p:nvPr/>
+            </p:nvPicPr>
+            <p:blipFill>
+              <a:blip r:embed="rId5"/>
+              <a:srcRect l="46332" t="3916" b="213"/>
+              <a:stretch/>
+            </p:blipFill>
+            <p:spPr>
+              <a:xfrm>
+                <a:off x="4017081" y="3305095"/>
+                <a:ext cx="512022" cy="1851105"/>
+              </a:xfrm>
+              <a:prstGeom prst="rect">
+                <a:avLst/>
+              </a:prstGeom>
+            </p:spPr>
+          </p:pic>
+          <p:sp>
+            <p:nvSpPr>
+              <p:cNvPr id="30" name="TextBox 29">
+                <a:extLst>
+                  <a:ext uri="{FF2B5EF4-FFF2-40B4-BE49-F238E27FC236}">
+                    <a16:creationId xmlns:a16="http://schemas.microsoft.com/office/drawing/2014/main" id="{76C53AD2-DAC0-5BDB-96FF-8BBF0335064B}"/>
+                  </a:ext>
+                </a:extLst>
+              </p:cNvPr>
+              <p:cNvSpPr txBox="1"/>
+              <p:nvPr/>
+            </p:nvSpPr>
+            <p:spPr>
+              <a:xfrm>
+                <a:off x="4099797" y="3197251"/>
+                <a:ext cx="453249" cy="261610"/>
+              </a:xfrm>
+              <a:prstGeom prst="rect">
+                <a:avLst/>
+              </a:prstGeom>
+              <a:noFill/>
+            </p:spPr>
+            <p:txBody>
+              <a:bodyPr wrap="square" rtlCol="0">
+                <a:spAutoFit/>
+              </a:bodyPr>
+              <a:lstStyle/>
+              <a:p>
+                <a:r>
+                  <a:rPr lang="en-US" sz="1100" dirty="0"/>
+                  <a:t>sex</a:t>
+                </a:r>
+              </a:p>
+            </p:txBody>
+          </p:sp>
+          <p:pic>
+            <p:nvPicPr>
+              <p:cNvPr id="31" name="Picture 30">
+                <a:extLst>
+                  <a:ext uri="{FF2B5EF4-FFF2-40B4-BE49-F238E27FC236}">
+                    <a16:creationId xmlns:a16="http://schemas.microsoft.com/office/drawing/2014/main" id="{D571B40B-E8A9-3E84-C33B-45B662C791CF}"/>
+                  </a:ext>
+                </a:extLst>
+              </p:cNvPr>
+              <p:cNvPicPr>
+                <a:picLocks noChangeAspect="1"/>
+              </p:cNvPicPr>
+              <p:nvPr/>
+            </p:nvPicPr>
+            <p:blipFill>
+              <a:blip r:embed="rId6"/>
+              <a:srcRect l="45936" r="574"/>
+              <a:stretch/>
+            </p:blipFill>
+            <p:spPr>
+              <a:xfrm>
+                <a:off x="4609332" y="3222071"/>
+                <a:ext cx="555665" cy="2102404"/>
+              </a:xfrm>
+              <a:prstGeom prst="rect">
+                <a:avLst/>
+              </a:prstGeom>
+            </p:spPr>
+          </p:pic>
+          <p:sp>
+            <p:nvSpPr>
+              <p:cNvPr id="32" name="TextBox 31">
+                <a:extLst>
+                  <a:ext uri="{FF2B5EF4-FFF2-40B4-BE49-F238E27FC236}">
+                    <a16:creationId xmlns:a16="http://schemas.microsoft.com/office/drawing/2014/main" id="{F389C1C0-5AFC-953D-E262-F04179AD8B7F}"/>
+                  </a:ext>
+                </a:extLst>
+              </p:cNvPr>
+              <p:cNvSpPr txBox="1"/>
+              <p:nvPr/>
+            </p:nvSpPr>
+            <p:spPr>
+              <a:xfrm>
+                <a:off x="4590154" y="3197251"/>
+                <a:ext cx="672794" cy="261610"/>
+              </a:xfrm>
+              <a:prstGeom prst="rect">
+                <a:avLst/>
+              </a:prstGeom>
+              <a:noFill/>
+            </p:spPr>
+            <p:txBody>
+              <a:bodyPr wrap="square" rtlCol="0">
+                <a:spAutoFit/>
+              </a:bodyPr>
+              <a:lstStyle/>
+              <a:p>
+                <a:r>
+                  <a:rPr lang="en-US" sz="1100" dirty="0"/>
+                  <a:t>cancer</a:t>
+                </a:r>
+              </a:p>
+            </p:txBody>
+          </p:sp>
+          <p:sp>
+            <p:nvSpPr>
+              <p:cNvPr id="33" name="TextBox 32">
+                <a:extLst>
+                  <a:ext uri="{FF2B5EF4-FFF2-40B4-BE49-F238E27FC236}">
+                    <a16:creationId xmlns:a16="http://schemas.microsoft.com/office/drawing/2014/main" id="{C7D9578B-95EA-66A8-1740-17B0A33013BF}"/>
+                  </a:ext>
+                </a:extLst>
+              </p:cNvPr>
+              <p:cNvSpPr txBox="1"/>
+              <p:nvPr/>
+            </p:nvSpPr>
+            <p:spPr>
+              <a:xfrm>
+                <a:off x="621336" y="5218848"/>
+                <a:ext cx="4974970" cy="307777"/>
+              </a:xfrm>
+              <a:prstGeom prst="rect">
+                <a:avLst/>
+              </a:prstGeom>
+              <a:noFill/>
+            </p:spPr>
+            <p:txBody>
+              <a:bodyPr wrap="square" rtlCol="0">
+                <a:spAutoFit/>
+              </a:bodyPr>
+              <a:lstStyle/>
+              <a:p>
+                <a:r>
+                  <a:rPr lang="en-US" sz="1400" dirty="0"/>
+                  <a:t>(b) per-group analysis of average DSC across all algorithms</a:t>
+                </a:r>
+              </a:p>
+            </p:txBody>
+          </p:sp>
+          <p:sp>
+            <p:nvSpPr>
+              <p:cNvPr id="34" name="TextBox 33">
+                <a:extLst>
+                  <a:ext uri="{FF2B5EF4-FFF2-40B4-BE49-F238E27FC236}">
+                    <a16:creationId xmlns:a16="http://schemas.microsoft.com/office/drawing/2014/main" id="{4DDB1EE5-6C36-08B5-158F-320643701C0F}"/>
+                  </a:ext>
+                </a:extLst>
+              </p:cNvPr>
+              <p:cNvSpPr txBox="1"/>
+              <p:nvPr/>
+            </p:nvSpPr>
+            <p:spPr>
+              <a:xfrm>
+                <a:off x="621336" y="3743635"/>
+                <a:ext cx="353943" cy="433386"/>
+              </a:xfrm>
+              <a:prstGeom prst="rect">
+                <a:avLst/>
+              </a:prstGeom>
+              <a:noFill/>
+            </p:spPr>
+            <p:txBody>
+              <a:bodyPr vert="vert270" wrap="square" rtlCol="0">
+                <a:spAutoFit/>
+              </a:bodyPr>
+              <a:lstStyle/>
+              <a:p>
+                <a:r>
+                  <a:rPr lang="en-US" sz="1100" dirty="0"/>
+                  <a:t>DSC</a:t>
+                </a:r>
+              </a:p>
+            </p:txBody>
+          </p:sp>
+        </p:grpSp>
         <p:sp>
           <p:nvSpPr>
-            <p:cNvPr id="14" name="TextBox 13">
+            <p:cNvPr id="35" name="TextBox 34">
               <a:extLst>
                 <a:ext uri="{FF2B5EF4-FFF2-40B4-BE49-F238E27FC236}">
-                  <a16:creationId xmlns:a16="http://schemas.microsoft.com/office/drawing/2014/main" id="{A0DCD34E-245A-B39F-B3A9-3872C9FB9EC5}"/>
+                  <a16:creationId xmlns:a16="http://schemas.microsoft.com/office/drawing/2014/main" id="{8F455FB6-B914-279D-3E24-6E53F5DCE1F0}"/>
                 </a:ext>
               </a:extLst>
             </p:cNvPr>
@@ -3420,354 +3877,7 @@
           </p:nvSpPr>
           <p:spPr>
             <a:xfrm>
-              <a:off x="5247713" y="5218848"/>
-              <a:ext cx="4974970" cy="307777"/>
-            </a:xfrm>
-            <a:prstGeom prst="rect">
-              <a:avLst/>
-            </a:prstGeom>
-            <a:noFill/>
-          </p:spPr>
-          <p:txBody>
-            <a:bodyPr wrap="square" rtlCol="0">
-              <a:spAutoFit/>
-            </a:bodyPr>
-            <a:lstStyle/>
-            <a:p>
-              <a:r>
-                <a:rPr lang="en-US" sz="1400" dirty="0"/>
-                <a:t>(c) significance heatmaps: pair-wise comparison of algorithms</a:t>
-              </a:r>
-            </a:p>
-          </p:txBody>
-        </p:sp>
-      </p:grpSp>
-      <p:grpSp>
-        <p:nvGrpSpPr>
-          <p:cNvPr id="21" name="Group 20">
-            <a:extLst>
-              <a:ext uri="{FF2B5EF4-FFF2-40B4-BE49-F238E27FC236}">
-                <a16:creationId xmlns:a16="http://schemas.microsoft.com/office/drawing/2014/main" id="{A60D2BFB-0F3A-CD93-F020-343E27120D07}"/>
-              </a:ext>
-            </a:extLst>
-          </p:cNvPr>
-          <p:cNvGrpSpPr/>
-          <p:nvPr/>
-        </p:nvGrpSpPr>
-        <p:grpSpPr>
-          <a:xfrm>
-            <a:off x="621336" y="3197251"/>
-            <a:ext cx="4974970" cy="2329374"/>
-            <a:chOff x="621336" y="3197251"/>
-            <a:chExt cx="4974970" cy="2329374"/>
-          </a:xfrm>
-        </p:grpSpPr>
-        <p:pic>
-          <p:nvPicPr>
-            <p:cNvPr id="7" name="Picture 6">
-              <a:extLst>
-                <a:ext uri="{FF2B5EF4-FFF2-40B4-BE49-F238E27FC236}">
-                  <a16:creationId xmlns:a16="http://schemas.microsoft.com/office/drawing/2014/main" id="{E8BEE714-789E-FE90-A1C7-AC260419A9ED}"/>
-                </a:ext>
-              </a:extLst>
-            </p:cNvPr>
-            <p:cNvPicPr>
-              <a:picLocks noChangeAspect="1"/>
-            </p:cNvPicPr>
-            <p:nvPr/>
-          </p:nvPicPr>
-          <p:blipFill>
-            <a:blip r:embed="rId3"/>
-            <a:srcRect l="11482" t="3602" r="206" b="20190"/>
-            <a:stretch/>
-          </p:blipFill>
-          <p:spPr>
-            <a:xfrm>
-              <a:off x="862780" y="3287360"/>
-              <a:ext cx="1912949" cy="1822280"/>
-            </a:xfrm>
-            <a:prstGeom prst="rect">
-              <a:avLst/>
-            </a:prstGeom>
-          </p:spPr>
-        </p:pic>
-        <p:sp>
-          <p:nvSpPr>
-            <p:cNvPr id="20" name="TextBox 19">
-              <a:extLst>
-                <a:ext uri="{FF2B5EF4-FFF2-40B4-BE49-F238E27FC236}">
-                  <a16:creationId xmlns:a16="http://schemas.microsoft.com/office/drawing/2014/main" id="{CBC06783-9D52-D0EB-2E76-69C6BA35DE22}"/>
-                </a:ext>
-              </a:extLst>
-            </p:cNvPr>
-            <p:cNvSpPr txBox="1"/>
-            <p:nvPr/>
-          </p:nvSpPr>
-          <p:spPr>
-            <a:xfrm>
-              <a:off x="1781530" y="3197251"/>
-              <a:ext cx="453249" cy="261610"/>
-            </a:xfrm>
-            <a:prstGeom prst="rect">
-              <a:avLst/>
-            </a:prstGeom>
-            <a:noFill/>
-          </p:spPr>
-          <p:txBody>
-            <a:bodyPr wrap="square" rtlCol="0">
-              <a:spAutoFit/>
-            </a:bodyPr>
-            <a:lstStyle/>
-            <a:p>
-              <a:r>
-                <a:rPr lang="en-US" sz="1100" dirty="0"/>
-                <a:t>age</a:t>
-              </a:r>
-            </a:p>
-          </p:txBody>
-        </p:sp>
-        <p:pic>
-          <p:nvPicPr>
-            <p:cNvPr id="16" name="Picture 15">
-              <a:extLst>
-                <a:ext uri="{FF2B5EF4-FFF2-40B4-BE49-F238E27FC236}">
-                  <a16:creationId xmlns:a16="http://schemas.microsoft.com/office/drawing/2014/main" id="{378A7179-3DAB-50FC-4764-F49BAE72B01F}"/>
-                </a:ext>
-              </a:extLst>
-            </p:cNvPr>
-            <p:cNvPicPr>
-              <a:picLocks noChangeAspect="1"/>
-            </p:cNvPicPr>
-            <p:nvPr/>
-          </p:nvPicPr>
-          <p:blipFill>
-            <a:blip r:embed="rId4"/>
-            <a:srcRect l="28111" t="18" b="18"/>
-            <a:stretch/>
-          </p:blipFill>
-          <p:spPr>
-            <a:xfrm>
-              <a:off x="2823194" y="3225129"/>
-              <a:ext cx="1156779" cy="2010693"/>
-            </a:xfrm>
-            <a:prstGeom prst="rect">
-              <a:avLst/>
-            </a:prstGeom>
-          </p:spPr>
-        </p:pic>
-        <p:sp>
-          <p:nvSpPr>
-            <p:cNvPr id="9" name="TextBox 8">
-              <a:extLst>
-                <a:ext uri="{FF2B5EF4-FFF2-40B4-BE49-F238E27FC236}">
-                  <a16:creationId xmlns:a16="http://schemas.microsoft.com/office/drawing/2014/main" id="{4C488C42-DA4A-6C1E-FA2E-C56DCC8B2907}"/>
-                </a:ext>
-              </a:extLst>
-            </p:cNvPr>
-            <p:cNvSpPr txBox="1"/>
-            <p:nvPr/>
-          </p:nvSpPr>
-          <p:spPr>
-            <a:xfrm>
-              <a:off x="3251987" y="3197251"/>
-              <a:ext cx="577898" cy="261610"/>
-            </a:xfrm>
-            <a:prstGeom prst="rect">
-              <a:avLst/>
-            </a:prstGeom>
-            <a:noFill/>
-          </p:spPr>
-          <p:txBody>
-            <a:bodyPr wrap="square" rtlCol="0">
-              <a:spAutoFit/>
-            </a:bodyPr>
-            <a:lstStyle/>
-            <a:p>
-              <a:r>
-                <a:rPr lang="en-US" sz="1100" dirty="0"/>
-                <a:t>race</a:t>
-              </a:r>
-            </a:p>
-          </p:txBody>
-        </p:sp>
-        <p:pic>
-          <p:nvPicPr>
-            <p:cNvPr id="18" name="Picture 17">
-              <a:extLst>
-                <a:ext uri="{FF2B5EF4-FFF2-40B4-BE49-F238E27FC236}">
-                  <a16:creationId xmlns:a16="http://schemas.microsoft.com/office/drawing/2014/main" id="{37B142F6-2A15-D83D-29F3-EEAC45E7397A}"/>
-                </a:ext>
-              </a:extLst>
-            </p:cNvPr>
-            <p:cNvPicPr>
-              <a:picLocks noChangeAspect="1"/>
-            </p:cNvPicPr>
-            <p:nvPr/>
-          </p:nvPicPr>
-          <p:blipFill>
-            <a:blip r:embed="rId5"/>
-            <a:srcRect l="46332" t="3916" b="213"/>
-            <a:stretch/>
-          </p:blipFill>
-          <p:spPr>
-            <a:xfrm>
-              <a:off x="4017081" y="3305095"/>
-              <a:ext cx="512022" cy="1851105"/>
-            </a:xfrm>
-            <a:prstGeom prst="rect">
-              <a:avLst/>
-            </a:prstGeom>
-          </p:spPr>
-        </p:pic>
-        <p:sp>
-          <p:nvSpPr>
-            <p:cNvPr id="11" name="TextBox 10">
-              <a:extLst>
-                <a:ext uri="{FF2B5EF4-FFF2-40B4-BE49-F238E27FC236}">
-                  <a16:creationId xmlns:a16="http://schemas.microsoft.com/office/drawing/2014/main" id="{0102A234-9C79-B32D-D57A-04EE4B75BE10}"/>
-                </a:ext>
-              </a:extLst>
-            </p:cNvPr>
-            <p:cNvSpPr txBox="1"/>
-            <p:nvPr/>
-          </p:nvSpPr>
-          <p:spPr>
-            <a:xfrm>
-              <a:off x="4099797" y="3197251"/>
-              <a:ext cx="453249" cy="261610"/>
-            </a:xfrm>
-            <a:prstGeom prst="rect">
-              <a:avLst/>
-            </a:prstGeom>
-            <a:noFill/>
-          </p:spPr>
-          <p:txBody>
-            <a:bodyPr wrap="square" rtlCol="0">
-              <a:spAutoFit/>
-            </a:bodyPr>
-            <a:lstStyle/>
-            <a:p>
-              <a:r>
-                <a:rPr lang="en-US" sz="1100" dirty="0"/>
-                <a:t>sex</a:t>
-              </a:r>
-            </a:p>
-          </p:txBody>
-        </p:sp>
-        <p:pic>
-          <p:nvPicPr>
-            <p:cNvPr id="10" name="Picture 9">
-              <a:extLst>
-                <a:ext uri="{FF2B5EF4-FFF2-40B4-BE49-F238E27FC236}">
-                  <a16:creationId xmlns:a16="http://schemas.microsoft.com/office/drawing/2014/main" id="{5DFB2FFE-6EEA-87BC-D4CD-04FF1E8564DC}"/>
-                </a:ext>
-              </a:extLst>
-            </p:cNvPr>
-            <p:cNvPicPr>
-              <a:picLocks noChangeAspect="1"/>
-            </p:cNvPicPr>
-            <p:nvPr/>
-          </p:nvPicPr>
-          <p:blipFill>
-            <a:blip r:embed="rId6"/>
-            <a:srcRect l="45936" r="574"/>
-            <a:stretch/>
-          </p:blipFill>
-          <p:spPr>
-            <a:xfrm>
-              <a:off x="4609332" y="3222071"/>
-              <a:ext cx="555665" cy="2102404"/>
-            </a:xfrm>
-            <a:prstGeom prst="rect">
-              <a:avLst/>
-            </a:prstGeom>
-          </p:spPr>
-        </p:pic>
-        <p:sp>
-          <p:nvSpPr>
-            <p:cNvPr id="29" name="TextBox 28">
-              <a:extLst>
-                <a:ext uri="{FF2B5EF4-FFF2-40B4-BE49-F238E27FC236}">
-                  <a16:creationId xmlns:a16="http://schemas.microsoft.com/office/drawing/2014/main" id="{54476243-818E-D328-7729-450DAF5D9CAF}"/>
-                </a:ext>
-              </a:extLst>
-            </p:cNvPr>
-            <p:cNvSpPr txBox="1"/>
-            <p:nvPr/>
-          </p:nvSpPr>
-          <p:spPr>
-            <a:xfrm>
-              <a:off x="4590154" y="3197251"/>
-              <a:ext cx="672794" cy="261610"/>
-            </a:xfrm>
-            <a:prstGeom prst="rect">
-              <a:avLst/>
-            </a:prstGeom>
-            <a:noFill/>
-          </p:spPr>
-          <p:txBody>
-            <a:bodyPr wrap="square" rtlCol="0">
-              <a:spAutoFit/>
-            </a:bodyPr>
-            <a:lstStyle/>
-            <a:p>
-              <a:r>
-                <a:rPr lang="en-US" sz="1100" dirty="0"/>
-                <a:t>cancer</a:t>
-              </a:r>
-            </a:p>
-          </p:txBody>
-        </p:sp>
-        <p:sp>
-          <p:nvSpPr>
-            <p:cNvPr id="13" name="TextBox 12">
-              <a:extLst>
-                <a:ext uri="{FF2B5EF4-FFF2-40B4-BE49-F238E27FC236}">
-                  <a16:creationId xmlns:a16="http://schemas.microsoft.com/office/drawing/2014/main" id="{76A3CB56-5665-D2D3-9D67-45B98867F6C0}"/>
-                </a:ext>
-              </a:extLst>
-            </p:cNvPr>
-            <p:cNvSpPr txBox="1"/>
-            <p:nvPr/>
-          </p:nvSpPr>
-          <p:spPr>
-            <a:xfrm>
-              <a:off x="621336" y="5218848"/>
-              <a:ext cx="4974970" cy="307777"/>
-            </a:xfrm>
-            <a:prstGeom prst="rect">
-              <a:avLst/>
-            </a:prstGeom>
-            <a:noFill/>
-          </p:spPr>
-          <p:txBody>
-            <a:bodyPr wrap="square" rtlCol="0">
-              <a:spAutoFit/>
-            </a:bodyPr>
-            <a:lstStyle/>
-            <a:p>
-              <a:r>
-                <a:rPr lang="en-US" sz="1400" dirty="0"/>
-                <a:t>(b) per-group analysis of average DSC across all algorithms</a:t>
-              </a:r>
-            </a:p>
-          </p:txBody>
-        </p:sp>
-        <p:sp>
-          <p:nvSpPr>
-            <p:cNvPr id="8" name="TextBox 7">
-              <a:extLst>
-                <a:ext uri="{FF2B5EF4-FFF2-40B4-BE49-F238E27FC236}">
-                  <a16:creationId xmlns:a16="http://schemas.microsoft.com/office/drawing/2014/main" id="{A662A291-D0CE-29EB-C296-4E053DCEBA48}"/>
-                </a:ext>
-              </a:extLst>
-            </p:cNvPr>
-            <p:cNvSpPr txBox="1"/>
-            <p:nvPr/>
-          </p:nvSpPr>
-          <p:spPr>
-            <a:xfrm>
-              <a:off x="621336" y="3743635"/>
+              <a:off x="922985" y="1193770"/>
               <a:ext cx="353943" cy="433386"/>
             </a:xfrm>
             <a:prstGeom prst="rect">
@@ -3788,131 +3898,96 @@
             </a:p>
           </p:txBody>
         </p:sp>
-      </p:grpSp>
-      <p:sp>
-        <p:nvSpPr>
-          <p:cNvPr id="15" name="TextBox 14">
-            <a:extLst>
-              <a:ext uri="{FF2B5EF4-FFF2-40B4-BE49-F238E27FC236}">
-                <a16:creationId xmlns:a16="http://schemas.microsoft.com/office/drawing/2014/main" id="{332E66BF-7A3D-F69D-FC16-B03920F0BC33}"/>
-              </a:ext>
-            </a:extLst>
-          </p:cNvPr>
-          <p:cNvSpPr txBox="1"/>
-          <p:nvPr/>
-        </p:nvSpPr>
-        <p:spPr>
-          <a:xfrm>
-            <a:off x="621336" y="910435"/>
-            <a:ext cx="353943" cy="433386"/>
-          </a:xfrm>
-          <a:prstGeom prst="rect">
-            <a:avLst/>
-          </a:prstGeom>
-          <a:noFill/>
-        </p:spPr>
-        <p:txBody>
-          <a:bodyPr vert="vert270" wrap="square" rtlCol="0">
-            <a:spAutoFit/>
-          </a:bodyPr>
-          <a:lstStyle/>
-          <a:p>
-            <a:r>
-              <a:rPr lang="en-US" sz="1100" dirty="0"/>
-              <a:t>DSC</a:t>
-            </a:r>
-          </a:p>
-        </p:txBody>
-      </p:sp>
-      <p:grpSp>
-        <p:nvGrpSpPr>
-          <p:cNvPr id="22" name="Group 21">
-            <a:extLst>
-              <a:ext uri="{FF2B5EF4-FFF2-40B4-BE49-F238E27FC236}">
-                <a16:creationId xmlns:a16="http://schemas.microsoft.com/office/drawing/2014/main" id="{338E7C38-DD51-FEF2-705A-3FAFE3F1F9E4}"/>
-              </a:ext>
-            </a:extLst>
-          </p:cNvPr>
-          <p:cNvGrpSpPr/>
-          <p:nvPr/>
-        </p:nvGrpSpPr>
-        <p:grpSpPr>
-          <a:xfrm>
-            <a:off x="935552" y="429950"/>
-            <a:ext cx="4149446" cy="2775923"/>
-            <a:chOff x="935552" y="429950"/>
-            <a:chExt cx="4149446" cy="2775923"/>
-          </a:xfrm>
-        </p:grpSpPr>
-        <p:sp>
-          <p:nvSpPr>
-            <p:cNvPr id="12" name="TextBox 11">
+        <p:grpSp>
+          <p:nvGrpSpPr>
+            <p:cNvPr id="36" name="Group 35">
               <a:extLst>
                 <a:ext uri="{FF2B5EF4-FFF2-40B4-BE49-F238E27FC236}">
-                  <a16:creationId xmlns:a16="http://schemas.microsoft.com/office/drawing/2014/main" id="{9E30DB82-7CC0-9574-6B21-C40831B9CA54}"/>
+                  <a16:creationId xmlns:a16="http://schemas.microsoft.com/office/drawing/2014/main" id="{73D53D07-D3B4-127A-7602-11DCDAD09DF9}"/>
                 </a:ext>
               </a:extLst>
             </p:cNvPr>
-            <p:cNvSpPr txBox="1"/>
+            <p:cNvGrpSpPr/>
             <p:nvPr/>
-          </p:nvSpPr>
-          <p:spPr>
+          </p:nvGrpSpPr>
+          <p:grpSpPr>
             <a:xfrm>
-              <a:off x="1023687" y="2898096"/>
-              <a:ext cx="3904945" cy="307777"/>
+              <a:off x="1237201" y="713285"/>
+              <a:ext cx="4149446" cy="2775923"/>
+              <a:chOff x="935552" y="429950"/>
+              <a:chExt cx="4149446" cy="2775923"/>
             </a:xfrm>
-            <a:prstGeom prst="rect">
-              <a:avLst/>
-            </a:prstGeom>
-            <a:noFill/>
-          </p:spPr>
-          <p:txBody>
-            <a:bodyPr wrap="square" rtlCol="0">
-              <a:spAutoFit/>
-            </a:bodyPr>
-            <a:lstStyle/>
-            <a:p>
-              <a:r>
-                <a:rPr lang="en-US" sz="1400" dirty="0"/>
-                <a:t>(a) overall analysis of per-algorithm average DSC</a:t>
-              </a:r>
-            </a:p>
-          </p:txBody>
-        </p:sp>
-        <p:pic>
-          <p:nvPicPr>
-            <p:cNvPr id="6" name="Picture 5">
-              <a:extLst>
-                <a:ext uri="{FF2B5EF4-FFF2-40B4-BE49-F238E27FC236}">
-                  <a16:creationId xmlns:a16="http://schemas.microsoft.com/office/drawing/2014/main" id="{0EB394DE-5DB2-AC0C-4F7F-0343BFFC28DD}"/>
-                </a:ext>
-              </a:extLst>
-            </p:cNvPr>
-            <p:cNvPicPr>
-              <a:picLocks noChangeAspect="1"/>
-            </p:cNvPicPr>
-            <p:nvPr/>
-          </p:nvPicPr>
-          <p:blipFill>
-            <a:blip r:embed="rId7"/>
-            <a:srcRect l="5432" t="2975" r="2009" b="2968"/>
-            <a:stretch/>
-          </p:blipFill>
-          <p:spPr>
-            <a:xfrm>
-              <a:off x="935552" y="429950"/>
-              <a:ext cx="4149446" cy="2496562"/>
-            </a:xfrm>
-            <a:prstGeom prst="rect">
-              <a:avLst/>
-            </a:prstGeom>
-          </p:spPr>
-        </p:pic>
+          </p:grpSpPr>
+          <p:sp>
+            <p:nvSpPr>
+              <p:cNvPr id="37" name="TextBox 36">
+                <a:extLst>
+                  <a:ext uri="{FF2B5EF4-FFF2-40B4-BE49-F238E27FC236}">
+                    <a16:creationId xmlns:a16="http://schemas.microsoft.com/office/drawing/2014/main" id="{F1BAAE4D-65D1-AA45-153B-F9070DC10BB5}"/>
+                  </a:ext>
+                </a:extLst>
+              </p:cNvPr>
+              <p:cNvSpPr txBox="1"/>
+              <p:nvPr/>
+            </p:nvSpPr>
+            <p:spPr>
+              <a:xfrm>
+                <a:off x="1023687" y="2898096"/>
+                <a:ext cx="3904945" cy="307777"/>
+              </a:xfrm>
+              <a:prstGeom prst="rect">
+                <a:avLst/>
+              </a:prstGeom>
+              <a:noFill/>
+            </p:spPr>
+            <p:txBody>
+              <a:bodyPr wrap="square" rtlCol="0">
+                <a:spAutoFit/>
+              </a:bodyPr>
+              <a:lstStyle/>
+              <a:p>
+                <a:r>
+                  <a:rPr lang="en-US" sz="1400" dirty="0"/>
+                  <a:t>(a) overall analysis of per-algorithm average DSC</a:t>
+                </a:r>
+              </a:p>
+            </p:txBody>
+          </p:sp>
+          <p:pic>
+            <p:nvPicPr>
+              <p:cNvPr id="38" name="Picture 37">
+                <a:extLst>
+                  <a:ext uri="{FF2B5EF4-FFF2-40B4-BE49-F238E27FC236}">
+                    <a16:creationId xmlns:a16="http://schemas.microsoft.com/office/drawing/2014/main" id="{155B3B57-15A9-E4B8-1B45-4AAF0955B3A5}"/>
+                  </a:ext>
+                </a:extLst>
+              </p:cNvPr>
+              <p:cNvPicPr>
+                <a:picLocks noChangeAspect="1"/>
+              </p:cNvPicPr>
+              <p:nvPr/>
+            </p:nvPicPr>
+            <p:blipFill>
+              <a:blip r:embed="rId7"/>
+              <a:srcRect l="5432" t="2975" r="2009" b="2968"/>
+              <a:stretch/>
+            </p:blipFill>
+            <p:spPr>
+              <a:xfrm>
+                <a:off x="935552" y="429950"/>
+                <a:ext cx="4149446" cy="2496562"/>
+              </a:xfrm>
+              <a:prstGeom prst="rect">
+                <a:avLst/>
+              </a:prstGeom>
+            </p:spPr>
+          </p:pic>
+        </p:grpSp>
       </p:grpSp>
     </p:spTree>
     <p:extLst>
       <p:ext uri="{BB962C8B-B14F-4D97-AF65-F5344CB8AC3E}">
-        <p14:creationId xmlns:p14="http://schemas.microsoft.com/office/powerpoint/2010/main" val="1635893523"/>
+        <p14:creationId xmlns:p14="http://schemas.microsoft.com/office/powerpoint/2010/main" val="852210661"/>
       </p:ext>
     </p:extLst>
   </p:cSld>

</xml_diff>

<commit_message>
Update the JHH figure
</commit_message>
<xml_diff>
--- a/utils/JHHAnalysis.pptx
+++ b/utils/JHHAnalysis.pptx
@@ -4,6 +4,9 @@
   <p:sldMasterIdLst>
     <p:sldMasterId id="2147483648" r:id="rId1"/>
   </p:sldMasterIdLst>
+  <p:notesMasterIdLst>
+    <p:notesMasterId r:id="rId3"/>
+  </p:notesMasterIdLst>
   <p:sldIdLst>
     <p:sldId id="264" r:id="rId2"/>
   </p:sldIdLst>
@@ -141,6 +144,439 @@
     </p:ext>
   </p:extLst>
 </p:presentation>
+</file>
+
+<file path=ppt/notesMasters/notesMaster1.xml><?xml version="1.0" encoding="utf-8"?>
+<p:notesMaster xmlns:a="http://schemas.openxmlformats.org/drawingml/2006/main" xmlns:r="http://schemas.openxmlformats.org/officeDocument/2006/relationships" xmlns:p="http://schemas.openxmlformats.org/presentationml/2006/main">
+  <p:cSld>
+    <p:bg>
+      <p:bgRef idx="1001">
+        <a:schemeClr val="bg1"/>
+      </p:bgRef>
+    </p:bg>
+    <p:spTree>
+      <p:nvGrpSpPr>
+        <p:cNvPr id="1" name=""/>
+        <p:cNvGrpSpPr/>
+        <p:nvPr/>
+      </p:nvGrpSpPr>
+      <p:grpSpPr>
+        <a:xfrm>
+          <a:off x="0" y="0"/>
+          <a:ext cx="0" cy="0"/>
+          <a:chOff x="0" y="0"/>
+          <a:chExt cx="0" cy="0"/>
+        </a:xfrm>
+      </p:grpSpPr>
+      <p:sp>
+        <p:nvSpPr>
+          <p:cNvPr id="2" name="Header Placeholder 1"/>
+          <p:cNvSpPr>
+            <a:spLocks noGrp="1"/>
+          </p:cNvSpPr>
+          <p:nvPr>
+            <p:ph type="hdr" sz="quarter"/>
+          </p:nvPr>
+        </p:nvSpPr>
+        <p:spPr>
+          <a:xfrm>
+            <a:off x="0" y="0"/>
+            <a:ext cx="2971800" cy="458788"/>
+          </a:xfrm>
+          <a:prstGeom prst="rect">
+            <a:avLst/>
+          </a:prstGeom>
+        </p:spPr>
+        <p:txBody>
+          <a:bodyPr vert="horz" lIns="91440" tIns="45720" rIns="91440" bIns="45720" rtlCol="0"/>
+          <a:lstStyle>
+            <a:lvl1pPr algn="l">
+              <a:defRPr sz="1200"/>
+            </a:lvl1pPr>
+          </a:lstStyle>
+          <a:p>
+            <a:endParaRPr lang="en-US"/>
+          </a:p>
+        </p:txBody>
+      </p:sp>
+      <p:sp>
+        <p:nvSpPr>
+          <p:cNvPr id="3" name="Date Placeholder 2"/>
+          <p:cNvSpPr>
+            <a:spLocks noGrp="1"/>
+          </p:cNvSpPr>
+          <p:nvPr>
+            <p:ph type="dt" idx="1"/>
+          </p:nvPr>
+        </p:nvSpPr>
+        <p:spPr>
+          <a:xfrm>
+            <a:off x="3884613" y="0"/>
+            <a:ext cx="2971800" cy="458788"/>
+          </a:xfrm>
+          <a:prstGeom prst="rect">
+            <a:avLst/>
+          </a:prstGeom>
+        </p:spPr>
+        <p:txBody>
+          <a:bodyPr vert="horz" lIns="91440" tIns="45720" rIns="91440" bIns="45720" rtlCol="0"/>
+          <a:lstStyle>
+            <a:lvl1pPr algn="r">
+              <a:defRPr sz="1200"/>
+            </a:lvl1pPr>
+          </a:lstStyle>
+          <a:p>
+            <a:fld id="{B4FEDCFA-E737-6F41-8A1C-DDE4F11D0BAA}" type="datetimeFigureOut">
+              <a:rPr lang="en-US" smtClean="0"/>
+              <a:t>8/28/24</a:t>
+            </a:fld>
+            <a:endParaRPr lang="en-US"/>
+          </a:p>
+        </p:txBody>
+      </p:sp>
+      <p:sp>
+        <p:nvSpPr>
+          <p:cNvPr id="4" name="Slide Image Placeholder 3"/>
+          <p:cNvSpPr>
+            <a:spLocks noGrp="1" noRot="1" noChangeAspect="1"/>
+          </p:cNvSpPr>
+          <p:nvPr>
+            <p:ph type="sldImg" idx="2"/>
+          </p:nvPr>
+        </p:nvSpPr>
+        <p:spPr>
+          <a:xfrm>
+            <a:off x="685800" y="1143000"/>
+            <a:ext cx="5486400" cy="3086100"/>
+          </a:xfrm>
+          <a:prstGeom prst="rect">
+            <a:avLst/>
+          </a:prstGeom>
+          <a:noFill/>
+          <a:ln w="12700">
+            <a:solidFill>
+              <a:prstClr val="black"/>
+            </a:solidFill>
+          </a:ln>
+        </p:spPr>
+        <p:txBody>
+          <a:bodyPr vert="horz" lIns="91440" tIns="45720" rIns="91440" bIns="45720" rtlCol="0" anchor="ctr"/>
+          <a:lstStyle/>
+          <a:p>
+            <a:endParaRPr lang="en-US"/>
+          </a:p>
+        </p:txBody>
+      </p:sp>
+      <p:sp>
+        <p:nvSpPr>
+          <p:cNvPr id="5" name="Notes Placeholder 4"/>
+          <p:cNvSpPr>
+            <a:spLocks noGrp="1"/>
+          </p:cNvSpPr>
+          <p:nvPr>
+            <p:ph type="body" sz="quarter" idx="3"/>
+          </p:nvPr>
+        </p:nvSpPr>
+        <p:spPr>
+          <a:xfrm>
+            <a:off x="685800" y="4400550"/>
+            <a:ext cx="5486400" cy="3600450"/>
+          </a:xfrm>
+          <a:prstGeom prst="rect">
+            <a:avLst/>
+          </a:prstGeom>
+        </p:spPr>
+        <p:txBody>
+          <a:bodyPr vert="horz" lIns="91440" tIns="45720" rIns="91440" bIns="45720" rtlCol="0"/>
+          <a:lstStyle/>
+          <a:p>
+            <a:pPr lvl="0"/>
+            <a:r>
+              <a:rPr lang="en-US"/>
+              <a:t>Click to edit Master text styles</a:t>
+            </a:r>
+          </a:p>
+          <a:p>
+            <a:pPr lvl="1"/>
+            <a:r>
+              <a:rPr lang="en-US"/>
+              <a:t>Second level</a:t>
+            </a:r>
+          </a:p>
+          <a:p>
+            <a:pPr lvl="2"/>
+            <a:r>
+              <a:rPr lang="en-US"/>
+              <a:t>Third level</a:t>
+            </a:r>
+          </a:p>
+          <a:p>
+            <a:pPr lvl="3"/>
+            <a:r>
+              <a:rPr lang="en-US"/>
+              <a:t>Fourth level</a:t>
+            </a:r>
+          </a:p>
+          <a:p>
+            <a:pPr lvl="4"/>
+            <a:r>
+              <a:rPr lang="en-US"/>
+              <a:t>Fifth level</a:t>
+            </a:r>
+          </a:p>
+        </p:txBody>
+      </p:sp>
+      <p:sp>
+        <p:nvSpPr>
+          <p:cNvPr id="6" name="Footer Placeholder 5"/>
+          <p:cNvSpPr>
+            <a:spLocks noGrp="1"/>
+          </p:cNvSpPr>
+          <p:nvPr>
+            <p:ph type="ftr" sz="quarter" idx="4"/>
+          </p:nvPr>
+        </p:nvSpPr>
+        <p:spPr>
+          <a:xfrm>
+            <a:off x="0" y="8685213"/>
+            <a:ext cx="2971800" cy="458787"/>
+          </a:xfrm>
+          <a:prstGeom prst="rect">
+            <a:avLst/>
+          </a:prstGeom>
+        </p:spPr>
+        <p:txBody>
+          <a:bodyPr vert="horz" lIns="91440" tIns="45720" rIns="91440" bIns="45720" rtlCol="0" anchor="b"/>
+          <a:lstStyle>
+            <a:lvl1pPr algn="l">
+              <a:defRPr sz="1200"/>
+            </a:lvl1pPr>
+          </a:lstStyle>
+          <a:p>
+            <a:endParaRPr lang="en-US"/>
+          </a:p>
+        </p:txBody>
+      </p:sp>
+      <p:sp>
+        <p:nvSpPr>
+          <p:cNvPr id="7" name="Slide Number Placeholder 6"/>
+          <p:cNvSpPr>
+            <a:spLocks noGrp="1"/>
+          </p:cNvSpPr>
+          <p:nvPr>
+            <p:ph type="sldNum" sz="quarter" idx="5"/>
+          </p:nvPr>
+        </p:nvSpPr>
+        <p:spPr>
+          <a:xfrm>
+            <a:off x="3884613" y="8685213"/>
+            <a:ext cx="2971800" cy="458787"/>
+          </a:xfrm>
+          <a:prstGeom prst="rect">
+            <a:avLst/>
+          </a:prstGeom>
+        </p:spPr>
+        <p:txBody>
+          <a:bodyPr vert="horz" lIns="91440" tIns="45720" rIns="91440" bIns="45720" rtlCol="0" anchor="b"/>
+          <a:lstStyle>
+            <a:lvl1pPr algn="r">
+              <a:defRPr sz="1200"/>
+            </a:lvl1pPr>
+          </a:lstStyle>
+          <a:p>
+            <a:fld id="{AFF6E562-F097-4840-BBC5-669E4FF674E1}" type="slidenum">
+              <a:rPr lang="en-US" smtClean="0"/>
+              <a:t>‹#›</a:t>
+            </a:fld>
+            <a:endParaRPr lang="en-US"/>
+          </a:p>
+        </p:txBody>
+      </p:sp>
+    </p:spTree>
+    <p:extLst>
+      <p:ext uri="{BB962C8B-B14F-4D97-AF65-F5344CB8AC3E}">
+        <p14:creationId xmlns:p14="http://schemas.microsoft.com/office/powerpoint/2010/main" val="1788491145"/>
+      </p:ext>
+    </p:extLst>
+  </p:cSld>
+  <p:clrMap bg1="lt1" tx1="dk1" bg2="lt2" tx2="dk2" accent1="accent1" accent2="accent2" accent3="accent3" accent4="accent4" accent5="accent5" accent6="accent6" hlink="hlink" folHlink="folHlink"/>
+  <p:notesStyle>
+    <a:lvl1pPr marL="0" algn="l" defTabSz="914400" rtl="0" eaLnBrk="1" latinLnBrk="0" hangingPunct="1">
+      <a:defRPr sz="1200" kern="1200">
+        <a:solidFill>
+          <a:schemeClr val="tx1"/>
+        </a:solidFill>
+        <a:latin typeface="+mn-lt"/>
+        <a:ea typeface="+mn-ea"/>
+        <a:cs typeface="+mn-cs"/>
+      </a:defRPr>
+    </a:lvl1pPr>
+    <a:lvl2pPr marL="457200" algn="l" defTabSz="914400" rtl="0" eaLnBrk="1" latinLnBrk="0" hangingPunct="1">
+      <a:defRPr sz="1200" kern="1200">
+        <a:solidFill>
+          <a:schemeClr val="tx1"/>
+        </a:solidFill>
+        <a:latin typeface="+mn-lt"/>
+        <a:ea typeface="+mn-ea"/>
+        <a:cs typeface="+mn-cs"/>
+      </a:defRPr>
+    </a:lvl2pPr>
+    <a:lvl3pPr marL="914400" algn="l" defTabSz="914400" rtl="0" eaLnBrk="1" latinLnBrk="0" hangingPunct="1">
+      <a:defRPr sz="1200" kern="1200">
+        <a:solidFill>
+          <a:schemeClr val="tx1"/>
+        </a:solidFill>
+        <a:latin typeface="+mn-lt"/>
+        <a:ea typeface="+mn-ea"/>
+        <a:cs typeface="+mn-cs"/>
+      </a:defRPr>
+    </a:lvl3pPr>
+    <a:lvl4pPr marL="1371600" algn="l" defTabSz="914400" rtl="0" eaLnBrk="1" latinLnBrk="0" hangingPunct="1">
+      <a:defRPr sz="1200" kern="1200">
+        <a:solidFill>
+          <a:schemeClr val="tx1"/>
+        </a:solidFill>
+        <a:latin typeface="+mn-lt"/>
+        <a:ea typeface="+mn-ea"/>
+        <a:cs typeface="+mn-cs"/>
+      </a:defRPr>
+    </a:lvl4pPr>
+    <a:lvl5pPr marL="1828800" algn="l" defTabSz="914400" rtl="0" eaLnBrk="1" latinLnBrk="0" hangingPunct="1">
+      <a:defRPr sz="1200" kern="1200">
+        <a:solidFill>
+          <a:schemeClr val="tx1"/>
+        </a:solidFill>
+        <a:latin typeface="+mn-lt"/>
+        <a:ea typeface="+mn-ea"/>
+        <a:cs typeface="+mn-cs"/>
+      </a:defRPr>
+    </a:lvl5pPr>
+    <a:lvl6pPr marL="2286000" algn="l" defTabSz="914400" rtl="0" eaLnBrk="1" latinLnBrk="0" hangingPunct="1">
+      <a:defRPr sz="1200" kern="1200">
+        <a:solidFill>
+          <a:schemeClr val="tx1"/>
+        </a:solidFill>
+        <a:latin typeface="+mn-lt"/>
+        <a:ea typeface="+mn-ea"/>
+        <a:cs typeface="+mn-cs"/>
+      </a:defRPr>
+    </a:lvl6pPr>
+    <a:lvl7pPr marL="2743200" algn="l" defTabSz="914400" rtl="0" eaLnBrk="1" latinLnBrk="0" hangingPunct="1">
+      <a:defRPr sz="1200" kern="1200">
+        <a:solidFill>
+          <a:schemeClr val="tx1"/>
+        </a:solidFill>
+        <a:latin typeface="+mn-lt"/>
+        <a:ea typeface="+mn-ea"/>
+        <a:cs typeface="+mn-cs"/>
+      </a:defRPr>
+    </a:lvl7pPr>
+    <a:lvl8pPr marL="3200400" algn="l" defTabSz="914400" rtl="0" eaLnBrk="1" latinLnBrk="0" hangingPunct="1">
+      <a:defRPr sz="1200" kern="1200">
+        <a:solidFill>
+          <a:schemeClr val="tx1"/>
+        </a:solidFill>
+        <a:latin typeface="+mn-lt"/>
+        <a:ea typeface="+mn-ea"/>
+        <a:cs typeface="+mn-cs"/>
+      </a:defRPr>
+    </a:lvl8pPr>
+    <a:lvl9pPr marL="3657600" algn="l" defTabSz="914400" rtl="0" eaLnBrk="1" latinLnBrk="0" hangingPunct="1">
+      <a:defRPr sz="1200" kern="1200">
+        <a:solidFill>
+          <a:schemeClr val="tx1"/>
+        </a:solidFill>
+        <a:latin typeface="+mn-lt"/>
+        <a:ea typeface="+mn-ea"/>
+        <a:cs typeface="+mn-cs"/>
+      </a:defRPr>
+    </a:lvl9pPr>
+  </p:notesStyle>
+</p:notesMaster>
+</file>
+
+<file path=ppt/notesSlides/notesSlide1.xml><?xml version="1.0" encoding="utf-8"?>
+<p:notes xmlns:a="http://schemas.openxmlformats.org/drawingml/2006/main" xmlns:r="http://schemas.openxmlformats.org/officeDocument/2006/relationships" xmlns:p="http://schemas.openxmlformats.org/presentationml/2006/main">
+  <p:cSld>
+    <p:spTree>
+      <p:nvGrpSpPr>
+        <p:cNvPr id="1" name=""/>
+        <p:cNvGrpSpPr/>
+        <p:nvPr/>
+      </p:nvGrpSpPr>
+      <p:grpSpPr>
+        <a:xfrm>
+          <a:off x="0" y="0"/>
+          <a:ext cx="0" cy="0"/>
+          <a:chOff x="0" y="0"/>
+          <a:chExt cx="0" cy="0"/>
+        </a:xfrm>
+      </p:grpSpPr>
+      <p:sp>
+        <p:nvSpPr>
+          <p:cNvPr id="2" name="Slide Image Placeholder 1"/>
+          <p:cNvSpPr>
+            <a:spLocks noGrp="1" noRot="1" noChangeAspect="1"/>
+          </p:cNvSpPr>
+          <p:nvPr>
+            <p:ph type="sldImg"/>
+          </p:nvPr>
+        </p:nvSpPr>
+        <p:spPr/>
+      </p:sp>
+      <p:sp>
+        <p:nvSpPr>
+          <p:cNvPr id="3" name="Notes Placeholder 2"/>
+          <p:cNvSpPr>
+            <a:spLocks noGrp="1"/>
+          </p:cNvSpPr>
+          <p:nvPr>
+            <p:ph type="body" idx="1"/>
+          </p:nvPr>
+        </p:nvSpPr>
+        <p:spPr/>
+        <p:txBody>
+          <a:bodyPr/>
+          <a:lstStyle/>
+          <a:p>
+            <a:endParaRPr lang="en-US" dirty="0"/>
+          </a:p>
+        </p:txBody>
+      </p:sp>
+      <p:sp>
+        <p:nvSpPr>
+          <p:cNvPr id="4" name="Slide Number Placeholder 3"/>
+          <p:cNvSpPr>
+            <a:spLocks noGrp="1"/>
+          </p:cNvSpPr>
+          <p:nvPr>
+            <p:ph type="sldNum" sz="quarter" idx="5"/>
+          </p:nvPr>
+        </p:nvSpPr>
+        <p:spPr/>
+        <p:txBody>
+          <a:bodyPr/>
+          <a:lstStyle/>
+          <a:p>
+            <a:fld id="{AFF6E562-F097-4840-BBC5-669E4FF674E1}" type="slidenum">
+              <a:rPr lang="en-US" smtClean="0"/>
+              <a:t>1</a:t>
+            </a:fld>
+            <a:endParaRPr lang="en-US"/>
+          </a:p>
+        </p:txBody>
+      </p:sp>
+    </p:spTree>
+    <p:extLst>
+      <p:ext uri="{BB962C8B-B14F-4D97-AF65-F5344CB8AC3E}">
+        <p14:creationId xmlns:p14="http://schemas.microsoft.com/office/powerpoint/2010/main" val="5194559"/>
+      </p:ext>
+    </p:extLst>
+  </p:cSld>
+  <p:clrMapOvr>
+    <a:masterClrMapping/>
+  </p:clrMapOvr>
+</p:notes>
 </file>
 
 <file path=ppt/slideLayouts/slideLayout1.xml><?xml version="1.0" encoding="utf-8"?>
@@ -3466,7 +3902,7 @@
               <p:nvPr/>
             </p:nvPicPr>
             <p:blipFill>
-              <a:blip r:embed="rId2"/>
+              <a:blip r:embed="rId3"/>
               <a:srcRect/>
               <a:stretch/>
             </p:blipFill>
@@ -3551,7 +3987,7 @@
               <p:nvPr/>
             </p:nvPicPr>
             <p:blipFill>
-              <a:blip r:embed="rId3"/>
+              <a:blip r:embed="rId4"/>
               <a:srcRect l="11482" t="3602" r="206" b="20190"/>
               <a:stretch/>
             </p:blipFill>
@@ -3615,7 +4051,7 @@
               <p:nvPr/>
             </p:nvPicPr>
             <p:blipFill>
-              <a:blip r:embed="rId4"/>
+              <a:blip r:embed="rId5"/>
               <a:srcRect l="28111" t="18" b="18"/>
               <a:stretch/>
             </p:blipFill>
@@ -3679,7 +4115,7 @@
               <p:nvPr/>
             </p:nvPicPr>
             <p:blipFill>
-              <a:blip r:embed="rId5"/>
+              <a:blip r:embed="rId6"/>
               <a:srcRect l="46332" t="3916" b="213"/>
               <a:stretch/>
             </p:blipFill>
@@ -3743,7 +4179,7 @@
               <p:nvPr/>
             </p:nvPicPr>
             <p:blipFill>
-              <a:blip r:embed="rId6"/>
+              <a:blip r:embed="rId7"/>
               <a:srcRect l="45936" r="574"/>
               <a:stretch/>
             </p:blipFill>
@@ -3822,7 +4258,7 @@
               <a:p>
                 <a:r>
                   <a:rPr lang="en-US" sz="1400" dirty="0"/>
-                  <a:t>(b) per-group analysis of average DSC across all algorithms</a:t>
+                  <a:t>(b) per-group analysis: average DSC across all algorithms</a:t>
                 </a:r>
               </a:p>
             </p:txBody>
@@ -3948,7 +4384,7 @@
               <a:p>
                 <a:r>
                   <a:rPr lang="en-US" sz="1400" dirty="0"/>
-                  <a:t>(a) overall analysis of per-algorithm average DSC</a:t>
+                  <a:t>(a) overall analysis: per-algorithm average DSC</a:t>
                 </a:r>
               </a:p>
             </p:txBody>
@@ -3968,7 +4404,7 @@
               <p:nvPr/>
             </p:nvPicPr>
             <p:blipFill>
-              <a:blip r:embed="rId7"/>
+              <a:blip r:embed="rId8"/>
               <a:srcRect l="5432" t="2975" r="2009" b="2968"/>
               <a:stretch/>
             </p:blipFill>
@@ -4310,4 +4746,319 @@
     </a:ext>
   </a:extLst>
 </a:theme>
+</file>
+
+<file path=ppt/theme/theme2.xml><?xml version="1.0" encoding="utf-8"?>
+<a:theme xmlns:a="http://schemas.openxmlformats.org/drawingml/2006/main" name="Office Theme">
+  <a:themeElements>
+    <a:clrScheme name="Office">
+      <a:dk1>
+        <a:sysClr val="windowText" lastClr="000000"/>
+      </a:dk1>
+      <a:lt1>
+        <a:sysClr val="window" lastClr="FFFFFF"/>
+      </a:lt1>
+      <a:dk2>
+        <a:srgbClr val="0E2841"/>
+      </a:dk2>
+      <a:lt2>
+        <a:srgbClr val="E8E8E8"/>
+      </a:lt2>
+      <a:accent1>
+        <a:srgbClr val="156082"/>
+      </a:accent1>
+      <a:accent2>
+        <a:srgbClr val="E97132"/>
+      </a:accent2>
+      <a:accent3>
+        <a:srgbClr val="196B24"/>
+      </a:accent3>
+      <a:accent4>
+        <a:srgbClr val="0F9ED5"/>
+      </a:accent4>
+      <a:accent5>
+        <a:srgbClr val="A02B93"/>
+      </a:accent5>
+      <a:accent6>
+        <a:srgbClr val="4EA72E"/>
+      </a:accent6>
+      <a:hlink>
+        <a:srgbClr val="467886"/>
+      </a:hlink>
+      <a:folHlink>
+        <a:srgbClr val="96607D"/>
+      </a:folHlink>
+    </a:clrScheme>
+    <a:fontScheme name="Office">
+      <a:majorFont>
+        <a:latin typeface="Aptos Display" panose="02110004020202020204"/>
+        <a:ea typeface=""/>
+        <a:cs typeface=""/>
+        <a:font script="Jpan" typeface="游ゴシック Light"/>
+        <a:font script="Hang" typeface="맑은 고딕"/>
+        <a:font script="Hans" typeface="等线 Light"/>
+        <a:font script="Hant" typeface="新細明體"/>
+        <a:font script="Arab" typeface="Times New Roman"/>
+        <a:font script="Hebr" typeface="Times New Roman"/>
+        <a:font script="Thai" typeface="Angsana New"/>
+        <a:font script="Ethi" typeface="Nyala"/>
+        <a:font script="Beng" typeface="Vrinda"/>
+        <a:font script="Gujr" typeface="Shruti"/>
+        <a:font script="Khmr" typeface="MoolBoran"/>
+        <a:font script="Knda" typeface="Tunga"/>
+        <a:font script="Guru" typeface="Raavi"/>
+        <a:font script="Cans" typeface="Euphemia"/>
+        <a:font script="Cher" typeface="Plantagenet Cherokee"/>
+        <a:font script="Yiii" typeface="Microsoft Yi Baiti"/>
+        <a:font script="Tibt" typeface="Microsoft Himalaya"/>
+        <a:font script="Thaa" typeface="MV Boli"/>
+        <a:font script="Deva" typeface="Mangal"/>
+        <a:font script="Telu" typeface="Gautami"/>
+        <a:font script="Taml" typeface="Latha"/>
+        <a:font script="Syrc" typeface="Estrangelo Edessa"/>
+        <a:font script="Orya" typeface="Kalinga"/>
+        <a:font script="Mlym" typeface="Kartika"/>
+        <a:font script="Laoo" typeface="DokChampa"/>
+        <a:font script="Sinh" typeface="Iskoola Pota"/>
+        <a:font script="Mong" typeface="Mongolian Baiti"/>
+        <a:font script="Viet" typeface="Times New Roman"/>
+        <a:font script="Uigh" typeface="Microsoft Uighur"/>
+        <a:font script="Geor" typeface="Sylfaen"/>
+        <a:font script="Armn" typeface="Arial"/>
+        <a:font script="Bugi" typeface="Leelawadee UI"/>
+        <a:font script="Bopo" typeface="Microsoft JhengHei"/>
+        <a:font script="Java" typeface="Javanese Text"/>
+        <a:font script="Lisu" typeface="Segoe UI"/>
+        <a:font script="Mymr" typeface="Myanmar Text"/>
+        <a:font script="Nkoo" typeface="Ebrima"/>
+        <a:font script="Olck" typeface="Nirmala UI"/>
+        <a:font script="Osma" typeface="Ebrima"/>
+        <a:font script="Phag" typeface="Phagspa"/>
+        <a:font script="Syrn" typeface="Estrangelo Edessa"/>
+        <a:font script="Syrj" typeface="Estrangelo Edessa"/>
+        <a:font script="Syre" typeface="Estrangelo Edessa"/>
+        <a:font script="Sora" typeface="Nirmala UI"/>
+        <a:font script="Tale" typeface="Microsoft Tai Le"/>
+        <a:font script="Talu" typeface="Microsoft New Tai Lue"/>
+        <a:font script="Tfng" typeface="Ebrima"/>
+      </a:majorFont>
+      <a:minorFont>
+        <a:latin typeface="Aptos" panose="02110004020202020204"/>
+        <a:ea typeface=""/>
+        <a:cs typeface=""/>
+        <a:font script="Jpan" typeface="游ゴシック"/>
+        <a:font script="Hang" typeface="맑은 고딕"/>
+        <a:font script="Hans" typeface="等线"/>
+        <a:font script="Hant" typeface="新細明體"/>
+        <a:font script="Arab" typeface="Arial"/>
+        <a:font script="Hebr" typeface="Arial"/>
+        <a:font script="Thai" typeface="Cordia New"/>
+        <a:font script="Ethi" typeface="Nyala"/>
+        <a:font script="Beng" typeface="Vrinda"/>
+        <a:font script="Gujr" typeface="Shruti"/>
+        <a:font script="Khmr" typeface="DaunPenh"/>
+        <a:font script="Knda" typeface="Tunga"/>
+        <a:font script="Guru" typeface="Raavi"/>
+        <a:font script="Cans" typeface="Euphemia"/>
+        <a:font script="Cher" typeface="Plantagenet Cherokee"/>
+        <a:font script="Yiii" typeface="Microsoft Yi Baiti"/>
+        <a:font script="Tibt" typeface="Microsoft Himalaya"/>
+        <a:font script="Thaa" typeface="MV Boli"/>
+        <a:font script="Deva" typeface="Mangal"/>
+        <a:font script="Telu" typeface="Gautami"/>
+        <a:font script="Taml" typeface="Latha"/>
+        <a:font script="Syrc" typeface="Estrangelo Edessa"/>
+        <a:font script="Orya" typeface="Kalinga"/>
+        <a:font script="Mlym" typeface="Kartika"/>
+        <a:font script="Laoo" typeface="DokChampa"/>
+        <a:font script="Sinh" typeface="Iskoola Pota"/>
+        <a:font script="Mong" typeface="Mongolian Baiti"/>
+        <a:font script="Viet" typeface="Arial"/>
+        <a:font script="Uigh" typeface="Microsoft Uighur"/>
+        <a:font script="Geor" typeface="Sylfaen"/>
+        <a:font script="Armn" typeface="Arial"/>
+        <a:font script="Bugi" typeface="Leelawadee UI"/>
+        <a:font script="Bopo" typeface="Microsoft JhengHei"/>
+        <a:font script="Java" typeface="Javanese Text"/>
+        <a:font script="Lisu" typeface="Segoe UI"/>
+        <a:font script="Mymr" typeface="Myanmar Text"/>
+        <a:font script="Nkoo" typeface="Ebrima"/>
+        <a:font script="Olck" typeface="Nirmala UI"/>
+        <a:font script="Osma" typeface="Ebrima"/>
+        <a:font script="Phag" typeface="Phagspa"/>
+        <a:font script="Syrn" typeface="Estrangelo Edessa"/>
+        <a:font script="Syrj" typeface="Estrangelo Edessa"/>
+        <a:font script="Syre" typeface="Estrangelo Edessa"/>
+        <a:font script="Sora" typeface="Nirmala UI"/>
+        <a:font script="Tale" typeface="Microsoft Tai Le"/>
+        <a:font script="Talu" typeface="Microsoft New Tai Lue"/>
+        <a:font script="Tfng" typeface="Ebrima"/>
+      </a:minorFont>
+    </a:fontScheme>
+    <a:fmtScheme name="Office">
+      <a:fillStyleLst>
+        <a:solidFill>
+          <a:schemeClr val="phClr"/>
+        </a:solidFill>
+        <a:gradFill rotWithShape="1">
+          <a:gsLst>
+            <a:gs pos="0">
+              <a:schemeClr val="phClr">
+                <a:lumMod val="110000"/>
+                <a:satMod val="105000"/>
+                <a:tint val="67000"/>
+              </a:schemeClr>
+            </a:gs>
+            <a:gs pos="50000">
+              <a:schemeClr val="phClr">
+                <a:lumMod val="105000"/>
+                <a:satMod val="103000"/>
+                <a:tint val="73000"/>
+              </a:schemeClr>
+            </a:gs>
+            <a:gs pos="100000">
+              <a:schemeClr val="phClr">
+                <a:lumMod val="105000"/>
+                <a:satMod val="109000"/>
+                <a:tint val="81000"/>
+              </a:schemeClr>
+            </a:gs>
+          </a:gsLst>
+          <a:lin ang="5400000" scaled="0"/>
+        </a:gradFill>
+        <a:gradFill rotWithShape="1">
+          <a:gsLst>
+            <a:gs pos="0">
+              <a:schemeClr val="phClr">
+                <a:satMod val="103000"/>
+                <a:lumMod val="102000"/>
+                <a:tint val="94000"/>
+              </a:schemeClr>
+            </a:gs>
+            <a:gs pos="50000">
+              <a:schemeClr val="phClr">
+                <a:satMod val="110000"/>
+                <a:lumMod val="100000"/>
+                <a:shade val="100000"/>
+              </a:schemeClr>
+            </a:gs>
+            <a:gs pos="100000">
+              <a:schemeClr val="phClr">
+                <a:lumMod val="99000"/>
+                <a:satMod val="120000"/>
+                <a:shade val="78000"/>
+              </a:schemeClr>
+            </a:gs>
+          </a:gsLst>
+          <a:lin ang="5400000" scaled="0"/>
+        </a:gradFill>
+      </a:fillStyleLst>
+      <a:lnStyleLst>
+        <a:ln w="12700" cap="flat" cmpd="sng" algn="ctr">
+          <a:solidFill>
+            <a:schemeClr val="phClr"/>
+          </a:solidFill>
+          <a:prstDash val="solid"/>
+          <a:miter lim="800000"/>
+        </a:ln>
+        <a:ln w="19050" cap="flat" cmpd="sng" algn="ctr">
+          <a:solidFill>
+            <a:schemeClr val="phClr"/>
+          </a:solidFill>
+          <a:prstDash val="solid"/>
+          <a:miter lim="800000"/>
+        </a:ln>
+        <a:ln w="25400" cap="flat" cmpd="sng" algn="ctr">
+          <a:solidFill>
+            <a:schemeClr val="phClr"/>
+          </a:solidFill>
+          <a:prstDash val="solid"/>
+          <a:miter lim="800000"/>
+        </a:ln>
+      </a:lnStyleLst>
+      <a:effectStyleLst>
+        <a:effectStyle>
+          <a:effectLst/>
+        </a:effectStyle>
+        <a:effectStyle>
+          <a:effectLst/>
+        </a:effectStyle>
+        <a:effectStyle>
+          <a:effectLst>
+            <a:outerShdw blurRad="57150" dist="19050" dir="5400000" algn="ctr" rotWithShape="0">
+              <a:srgbClr val="000000">
+                <a:alpha val="63000"/>
+              </a:srgbClr>
+            </a:outerShdw>
+          </a:effectLst>
+        </a:effectStyle>
+      </a:effectStyleLst>
+      <a:bgFillStyleLst>
+        <a:solidFill>
+          <a:schemeClr val="phClr"/>
+        </a:solidFill>
+        <a:solidFill>
+          <a:schemeClr val="phClr">
+            <a:tint val="95000"/>
+            <a:satMod val="170000"/>
+          </a:schemeClr>
+        </a:solidFill>
+        <a:gradFill rotWithShape="1">
+          <a:gsLst>
+            <a:gs pos="0">
+              <a:schemeClr val="phClr">
+                <a:tint val="93000"/>
+                <a:satMod val="150000"/>
+                <a:shade val="98000"/>
+                <a:lumMod val="102000"/>
+              </a:schemeClr>
+            </a:gs>
+            <a:gs pos="50000">
+              <a:schemeClr val="phClr">
+                <a:tint val="98000"/>
+                <a:satMod val="130000"/>
+                <a:shade val="90000"/>
+                <a:lumMod val="103000"/>
+              </a:schemeClr>
+            </a:gs>
+            <a:gs pos="100000">
+              <a:schemeClr val="phClr">
+                <a:shade val="63000"/>
+                <a:satMod val="120000"/>
+              </a:schemeClr>
+            </a:gs>
+          </a:gsLst>
+          <a:lin ang="5400000" scaled="0"/>
+        </a:gradFill>
+      </a:bgFillStyleLst>
+    </a:fmtScheme>
+  </a:themeElements>
+  <a:objectDefaults>
+    <a:lnDef>
+      <a:spPr/>
+      <a:bodyPr/>
+      <a:lstStyle/>
+      <a:style>
+        <a:lnRef idx="2">
+          <a:schemeClr val="accent1"/>
+        </a:lnRef>
+        <a:fillRef idx="0">
+          <a:schemeClr val="accent1"/>
+        </a:fillRef>
+        <a:effectRef idx="1">
+          <a:schemeClr val="accent1"/>
+        </a:effectRef>
+        <a:fontRef idx="minor">
+          <a:schemeClr val="tx1"/>
+        </a:fontRef>
+      </a:style>
+    </a:lnDef>
+  </a:objectDefaults>
+  <a:extraClrSchemeLst/>
+  <a:extLst>
+    <a:ext uri="{05A4C25C-085E-4340-85A3-A5531E510DB2}">
+      <thm15:themeFamily xmlns:thm15="http://schemas.microsoft.com/office/thememl/2012/main" name="Office Theme" id="{2E142A2C-CD16-42D6-873A-C26D2A0506FA}" vid="{1BDDFF52-6CD6-40A5-AB3C-68EB2F1E4D0A}"/>
+    </a:ext>
+  </a:extLst>
+</a:theme>
 </file>
</xml_diff>